<commit_message>
made some little changes
</commit_message>
<xml_diff>
--- a/JSTraining.pptx
+++ b/JSTraining.pptx
@@ -137,10 +137,6 @@
 </p:presentation>
 </file>
 
-<file path=ppt/revisionInfo.xml><?xml version="1.0" encoding="utf-8"?>
-<p1510:revInfo xmlns:a="http://schemas.openxmlformats.org/drawingml/2006/main" xmlns:r="http://schemas.openxmlformats.org/officeDocument/2006/relationships" xmlns:p1510="http://schemas.microsoft.com/office/powerpoint/2015/10/main"/>
-</file>
-
 <file path=ppt/notesMasters/notesMaster1.xml><?xml version="1.0" encoding="utf-8"?>
 <p:notesMaster xmlns:a="http://schemas.openxmlformats.org/drawingml/2006/main" xmlns:r="http://schemas.openxmlformats.org/officeDocument/2006/relationships" xmlns:p="http://schemas.openxmlformats.org/presentationml/2006/main">
   <p:cSld>
@@ -223,7 +219,7 @@
           <a:p>
             <a:fld id="{B09D8FFF-C90B-E940-9216-23AD5EAD5BA9}" type="datetimeFigureOut">
               <a:rPr lang="en-GB" smtClean="0"/>
-              <a:t>08/09/2017</a:t>
+              <a:t>01/02/2018</a:t>
             </a:fld>
             <a:endParaRPr lang="en-GB"/>
           </a:p>
@@ -709,7 +705,7 @@
           <a:p>
             <a:fld id="{AD0C2843-B122-3545-BEB5-3CB839A21497}" type="datetimeFigureOut">
               <a:rPr lang="en-GB" smtClean="0"/>
-              <a:t>08/09/2017</a:t>
+              <a:t>01/02/2018</a:t>
             </a:fld>
             <a:endParaRPr lang="en-GB"/>
           </a:p>
@@ -879,7 +875,7 @@
           <a:p>
             <a:fld id="{AD0C2843-B122-3545-BEB5-3CB839A21497}" type="datetimeFigureOut">
               <a:rPr lang="en-GB" smtClean="0"/>
-              <a:t>08/09/2017</a:t>
+              <a:t>01/02/2018</a:t>
             </a:fld>
             <a:endParaRPr lang="en-GB"/>
           </a:p>
@@ -1059,7 +1055,7 @@
           <a:p>
             <a:fld id="{AD0C2843-B122-3545-BEB5-3CB839A21497}" type="datetimeFigureOut">
               <a:rPr lang="en-GB" smtClean="0"/>
-              <a:t>08/09/2017</a:t>
+              <a:t>01/02/2018</a:t>
             </a:fld>
             <a:endParaRPr lang="en-GB"/>
           </a:p>
@@ -1229,7 +1225,7 @@
           <a:p>
             <a:fld id="{AD0C2843-B122-3545-BEB5-3CB839A21497}" type="datetimeFigureOut">
               <a:rPr lang="en-GB" smtClean="0"/>
-              <a:t>08/09/2017</a:t>
+              <a:t>01/02/2018</a:t>
             </a:fld>
             <a:endParaRPr lang="en-GB"/>
           </a:p>
@@ -1475,7 +1471,7 @@
           <a:p>
             <a:fld id="{AD0C2843-B122-3545-BEB5-3CB839A21497}" type="datetimeFigureOut">
               <a:rPr lang="en-GB" smtClean="0"/>
-              <a:t>08/09/2017</a:t>
+              <a:t>01/02/2018</a:t>
             </a:fld>
             <a:endParaRPr lang="en-GB"/>
           </a:p>
@@ -1707,7 +1703,7 @@
           <a:p>
             <a:fld id="{AD0C2843-B122-3545-BEB5-3CB839A21497}" type="datetimeFigureOut">
               <a:rPr lang="en-GB" smtClean="0"/>
-              <a:t>08/09/2017</a:t>
+              <a:t>01/02/2018</a:t>
             </a:fld>
             <a:endParaRPr lang="en-GB"/>
           </a:p>
@@ -2074,7 +2070,7 @@
           <a:p>
             <a:fld id="{AD0C2843-B122-3545-BEB5-3CB839A21497}" type="datetimeFigureOut">
               <a:rPr lang="en-GB" smtClean="0"/>
-              <a:t>08/09/2017</a:t>
+              <a:t>01/02/2018</a:t>
             </a:fld>
             <a:endParaRPr lang="en-GB"/>
           </a:p>
@@ -2192,7 +2188,7 @@
           <a:p>
             <a:fld id="{AD0C2843-B122-3545-BEB5-3CB839A21497}" type="datetimeFigureOut">
               <a:rPr lang="en-GB" smtClean="0"/>
-              <a:t>08/09/2017</a:t>
+              <a:t>01/02/2018</a:t>
             </a:fld>
             <a:endParaRPr lang="en-GB"/>
           </a:p>
@@ -2287,7 +2283,7 @@
           <a:p>
             <a:fld id="{AD0C2843-B122-3545-BEB5-3CB839A21497}" type="datetimeFigureOut">
               <a:rPr lang="en-GB" smtClean="0"/>
-              <a:t>08/09/2017</a:t>
+              <a:t>01/02/2018</a:t>
             </a:fld>
             <a:endParaRPr lang="en-GB"/>
           </a:p>
@@ -2564,7 +2560,7 @@
           <a:p>
             <a:fld id="{AD0C2843-B122-3545-BEB5-3CB839A21497}" type="datetimeFigureOut">
               <a:rPr lang="en-GB" smtClean="0"/>
-              <a:t>08/09/2017</a:t>
+              <a:t>01/02/2018</a:t>
             </a:fld>
             <a:endParaRPr lang="en-GB"/>
           </a:p>
@@ -2817,7 +2813,7 @@
           <a:p>
             <a:fld id="{AD0C2843-B122-3545-BEB5-3CB839A21497}" type="datetimeFigureOut">
               <a:rPr lang="en-GB" smtClean="0"/>
-              <a:t>08/09/2017</a:t>
+              <a:t>01/02/2018</a:t>
             </a:fld>
             <a:endParaRPr lang="en-GB"/>
           </a:p>
@@ -3030,7 +3026,7 @@
           <a:p>
             <a:fld id="{AD0C2843-B122-3545-BEB5-3CB839A21497}" type="datetimeFigureOut">
               <a:rPr lang="en-GB" smtClean="0"/>
-              <a:t>08/09/2017</a:t>
+              <a:t>01/02/2018</a:t>
             </a:fld>
             <a:endParaRPr lang="en-GB"/>
           </a:p>
@@ -3925,15 +3921,7 @@
             </a:r>
             <a:r>
               <a:rPr lang="en-GB" dirty="0"/>
-              <a:t>’); </a:t>
-            </a:r>
-            <a:r>
-              <a:rPr lang="en-GB" dirty="0" err="1"/>
-              <a:t>returs</a:t>
-            </a:r>
-            <a:r>
-              <a:rPr lang="en-GB" dirty="0"/>
-              <a:t> html Collection</a:t>
+              <a:t>’); returns html Collection</a:t>
             </a:r>
           </a:p>
           <a:p>
@@ -4848,13 +4836,8 @@
           <a:p>
             <a:r>
               <a:rPr lang="en-GB" dirty="0"/>
-              <a:t>HTML/CSS/</a:t>
-            </a:r>
-            <a:r>
-              <a:rPr lang="en-GB" dirty="0" err="1"/>
-              <a:t>Javascript</a:t>
-            </a:r>
-            <a:endParaRPr lang="en-GB" dirty="0"/>
+              <a:t>HTML/CSS/JavaScript</a:t>
+            </a:r>
           </a:p>
           <a:p>
             <a:r>

</xml_diff>

<commit_message>
reformatted the code, added "strict mode"
</commit_message>
<xml_diff>
--- a/JSTraining.pptx
+++ b/JSTraining.pptx
@@ -5,7 +5,7 @@
     <p:sldMasterId id="2147483648" r:id="rId1"/>
   </p:sldMasterIdLst>
   <p:notesMasterIdLst>
-    <p:notesMasterId r:id="rId25"/>
+    <p:notesMasterId r:id="rId26"/>
   </p:notesMasterIdLst>
   <p:sldIdLst>
     <p:sldId id="256" r:id="rId2"/>
@@ -15,22 +15,23 @@
     <p:sldId id="261" r:id="rId6"/>
     <p:sldId id="262" r:id="rId7"/>
     <p:sldId id="263" r:id="rId8"/>
-    <p:sldId id="264" r:id="rId9"/>
-    <p:sldId id="265" r:id="rId10"/>
-    <p:sldId id="266" r:id="rId11"/>
-    <p:sldId id="267" r:id="rId12"/>
-    <p:sldId id="268" r:id="rId13"/>
-    <p:sldId id="269" r:id="rId14"/>
-    <p:sldId id="270" r:id="rId15"/>
-    <p:sldId id="271" r:id="rId16"/>
-    <p:sldId id="273" r:id="rId17"/>
-    <p:sldId id="272" r:id="rId18"/>
-    <p:sldId id="274" r:id="rId19"/>
-    <p:sldId id="275" r:id="rId20"/>
-    <p:sldId id="276" r:id="rId21"/>
-    <p:sldId id="277" r:id="rId22"/>
+    <p:sldId id="265" r:id="rId9"/>
+    <p:sldId id="266" r:id="rId10"/>
+    <p:sldId id="267" r:id="rId11"/>
+    <p:sldId id="268" r:id="rId12"/>
+    <p:sldId id="269" r:id="rId13"/>
+    <p:sldId id="270" r:id="rId14"/>
+    <p:sldId id="271" r:id="rId15"/>
+    <p:sldId id="273" r:id="rId16"/>
+    <p:sldId id="272" r:id="rId17"/>
+    <p:sldId id="274" r:id="rId18"/>
+    <p:sldId id="275" r:id="rId19"/>
+    <p:sldId id="276" r:id="rId20"/>
+    <p:sldId id="277" r:id="rId21"/>
+    <p:sldId id="282" r:id="rId22"/>
     <p:sldId id="278" r:id="rId23"/>
     <p:sldId id="279" r:id="rId24"/>
+    <p:sldId id="281" r:id="rId25"/>
   </p:sldIdLst>
   <p:sldSz cx="12192000" cy="6858000"/>
   <p:notesSz cx="6858000" cy="9144000"/>
@@ -544,16 +545,10 @@
             </a:r>
           </a:p>
           <a:p>
-            <a:endParaRPr lang="de-CH" dirty="0"/>
-          </a:p>
-          <a:p>
             <a:r>
               <a:rPr lang="de-CH" dirty="0"/>
               <a:t>JS-Engine ist in allen Browsern verbaut, sie kann JavaScript interpretieren</a:t>
             </a:r>
-          </a:p>
-          <a:p>
-            <a:endParaRPr lang="de-CH" dirty="0"/>
           </a:p>
           <a:p>
             <a:r>
@@ -582,16 +577,10 @@
             </a:r>
           </a:p>
           <a:p>
-            <a:endParaRPr lang="de-CH" dirty="0"/>
-          </a:p>
-          <a:p>
             <a:r>
               <a:rPr lang="de-CH" dirty="0"/>
               <a:t>Frontend/Backend Technologie</a:t>
             </a:r>
-          </a:p>
-          <a:p>
-            <a:endParaRPr lang="de-CH" dirty="0"/>
           </a:p>
           <a:p>
             <a:pPr marL="0" marR="0" lvl="0" indent="0" algn="l" defTabSz="914400" rtl="0" eaLnBrk="1" fontAlgn="auto" latinLnBrk="0" hangingPunct="1">
@@ -624,9 +613,6 @@
               <a:t> auf, was auf «normalem» JavaScript basiert</a:t>
             </a:r>
           </a:p>
-          <a:p>
-            <a:endParaRPr lang="de-CH" dirty="0"/>
-          </a:p>
         </p:txBody>
       </p:sp>
       <p:sp>
@@ -656,6 +642,99 @@
     <p:extLst>
       <p:ext uri="{BB962C8B-B14F-4D97-AF65-F5344CB8AC3E}">
         <p14:creationId xmlns:p14="http://schemas.microsoft.com/office/powerpoint/2010/main" val="2577796029"/>
+      </p:ext>
+    </p:extLst>
+  </p:cSld>
+  <p:clrMapOvr>
+    <a:masterClrMapping/>
+  </p:clrMapOvr>
+</p:notes>
+</file>
+
+<file path=ppt/notesSlides/notesSlide10.xml><?xml version="1.0" encoding="utf-8"?>
+<p:notes xmlns:a="http://schemas.openxmlformats.org/drawingml/2006/main" xmlns:r="http://schemas.openxmlformats.org/officeDocument/2006/relationships" xmlns:p="http://schemas.openxmlformats.org/presentationml/2006/main">
+  <p:cSld>
+    <p:spTree>
+      <p:nvGrpSpPr>
+        <p:cNvPr id="1" name=""/>
+        <p:cNvGrpSpPr/>
+        <p:nvPr/>
+      </p:nvGrpSpPr>
+      <p:grpSpPr>
+        <a:xfrm>
+          <a:off x="0" y="0"/>
+          <a:ext cx="0" cy="0"/>
+          <a:chOff x="0" y="0"/>
+          <a:chExt cx="0" cy="0"/>
+        </a:xfrm>
+      </p:grpSpPr>
+      <p:sp>
+        <p:nvSpPr>
+          <p:cNvPr id="2" name="Folienbildplatzhalter 1"/>
+          <p:cNvSpPr>
+            <a:spLocks noGrp="1" noRot="1" noChangeAspect="1"/>
+          </p:cNvSpPr>
+          <p:nvPr>
+            <p:ph type="sldImg"/>
+          </p:nvPr>
+        </p:nvSpPr>
+        <p:spPr/>
+      </p:sp>
+      <p:sp>
+        <p:nvSpPr>
+          <p:cNvPr id="3" name="Notizenplatzhalter 2"/>
+          <p:cNvSpPr>
+            <a:spLocks noGrp="1"/>
+          </p:cNvSpPr>
+          <p:nvPr>
+            <p:ph type="body" idx="1"/>
+          </p:nvPr>
+        </p:nvSpPr>
+        <p:spPr/>
+        <p:txBody>
+          <a:bodyPr/>
+          <a:lstStyle/>
+          <a:p>
+            <a:r>
+              <a:rPr lang="de-CH" dirty="0"/>
+              <a:t>JS unsicher, weil Variablen keine Deklaration brauchen</a:t>
+            </a:r>
+          </a:p>
+          <a:p>
+            <a:r>
+              <a:rPr lang="de-CH" dirty="0"/>
+              <a:t>https://www.w3schools.com/js/js_strict.asp</a:t>
+            </a:r>
+          </a:p>
+        </p:txBody>
+      </p:sp>
+      <p:sp>
+        <p:nvSpPr>
+          <p:cNvPr id="4" name="Foliennummernplatzhalter 3"/>
+          <p:cNvSpPr>
+            <a:spLocks noGrp="1"/>
+          </p:cNvSpPr>
+          <p:nvPr>
+            <p:ph type="sldNum" sz="quarter" idx="10"/>
+          </p:nvPr>
+        </p:nvSpPr>
+        <p:spPr/>
+        <p:txBody>
+          <a:bodyPr/>
+          <a:lstStyle/>
+          <a:p>
+            <a:fld id="{44771577-2C5A-D741-B4F8-1C3FD3942A98}" type="slidenum">
+              <a:rPr lang="en-GB" smtClean="0"/>
+              <a:t>21</a:t>
+            </a:fld>
+            <a:endParaRPr lang="en-GB"/>
+          </a:p>
+        </p:txBody>
+      </p:sp>
+    </p:spTree>
+    <p:extLst>
+      <p:ext uri="{BB962C8B-B14F-4D97-AF65-F5344CB8AC3E}">
+        <p14:creationId xmlns:p14="http://schemas.microsoft.com/office/powerpoint/2010/main" val="3091983525"/>
       </p:ext>
     </p:extLst>
   </p:cSld>
@@ -728,7 +807,7 @@
             </a:pPr>
             <a:r>
               <a:rPr lang="de-CH" dirty="0"/>
-              <a:t>Sprachbeliebtheit</a:t>
+              <a:t>Sprachbeliebtheit (keine Aussage, wie gut eine Sprache ist)</a:t>
             </a:r>
           </a:p>
           <a:p>
@@ -878,7 +957,14 @@
               </a:rPr>
               <a:t>ES5 in allen modernen Browsern unterstützt (https://www.w3schools.com/js/js_versions.asp). </a:t>
             </a:r>
-            <a:endParaRPr lang="de-CH" dirty="0"/>
+          </a:p>
+          <a:p>
+            <a:r>
+              <a:rPr lang="de-CH" dirty="0">
+                <a:sym typeface="Wingdings" panose="05000000000000000000" pitchFamily="2" charset="2"/>
+              </a:rPr>
+              <a:t>Für noch mehr Infos zu ES6: https://webapplog.com/es6/</a:t>
+            </a:r>
           </a:p>
         </p:txBody>
       </p:sp>
@@ -968,9 +1054,6 @@
             </a:r>
           </a:p>
           <a:p>
-            <a:endParaRPr lang="de-CH" dirty="0"/>
-          </a:p>
-          <a:p>
             <a:r>
               <a:rPr lang="de-CH" dirty="0" err="1"/>
               <a:t>about:config</a:t>
@@ -1162,10 +1245,54 @@
           <a:bodyPr/>
           <a:lstStyle/>
           <a:p>
-            <a:r>
-              <a:rPr lang="de-CH" dirty="0"/>
-              <a:t>Diese Funktionen können auch auf anderen Elementen ausgeführt werden</a:t>
-            </a:r>
+            <a:pPr marL="0" marR="0" lvl="0" indent="0" algn="l" defTabSz="914400" rtl="0" eaLnBrk="1" fontAlgn="auto" latinLnBrk="0" hangingPunct="1">
+              <a:lnSpc>
+                <a:spcPct val="100000"/>
+              </a:lnSpc>
+              <a:spcBef>
+                <a:spcPts val="0"/>
+              </a:spcBef>
+              <a:spcAft>
+                <a:spcPts val="0"/>
+              </a:spcAft>
+              <a:buClrTx/>
+              <a:buSzTx/>
+              <a:buFontTx/>
+              <a:buNone/>
+              <a:tabLst/>
+              <a:defRPr/>
+            </a:pPr>
+            <a:r>
+              <a:rPr lang="de-CH" dirty="0">
+                <a:sym typeface="Wingdings" panose="05000000000000000000" pitchFamily="2" charset="2"/>
+              </a:rPr>
+              <a:t> Demo </a:t>
+            </a:r>
+            <a:r>
+              <a:rPr lang="de-CH" dirty="0" err="1">
+                <a:sym typeface="Wingdings" panose="05000000000000000000" pitchFamily="2" charset="2"/>
+              </a:rPr>
+              <a:t>var</a:t>
+            </a:r>
+            <a:r>
+              <a:rPr lang="de-CH" dirty="0">
+                <a:sym typeface="Wingdings" panose="05000000000000000000" pitchFamily="2" charset="2"/>
+              </a:rPr>
+              <a:t> vs. </a:t>
+            </a:r>
+            <a:r>
+              <a:rPr lang="de-CH" dirty="0" err="1">
+                <a:sym typeface="Wingdings" panose="05000000000000000000" pitchFamily="2" charset="2"/>
+              </a:rPr>
+              <a:t>let</a:t>
+            </a:r>
+            <a:r>
+              <a:rPr lang="de-CH" dirty="0">
+                <a:sym typeface="Wingdings" panose="05000000000000000000" pitchFamily="2" charset="2"/>
+              </a:rPr>
+              <a:t> (im Browser)</a:t>
+            </a:r>
+            <a:endParaRPr lang="de-CH" dirty="0"/>
           </a:p>
         </p:txBody>
       </p:sp>
@@ -1186,7 +1313,181 @@
           <a:p>
             <a:fld id="{44771577-2C5A-D741-B4F8-1C3FD3942A98}" type="slidenum">
               <a:rPr lang="en-GB" smtClean="0"/>
-              <a:t>12</a:t>
+              <a:t>8</a:t>
+            </a:fld>
+            <a:endParaRPr lang="en-GB"/>
+          </a:p>
+        </p:txBody>
+      </p:sp>
+    </p:spTree>
+    <p:extLst>
+      <p:ext uri="{BB962C8B-B14F-4D97-AF65-F5344CB8AC3E}">
+        <p14:creationId xmlns:p14="http://schemas.microsoft.com/office/powerpoint/2010/main" val="922053855"/>
+      </p:ext>
+    </p:extLst>
+  </p:cSld>
+  <p:clrMapOvr>
+    <a:masterClrMapping/>
+  </p:clrMapOvr>
+</p:notes>
+</file>
+
+<file path=ppt/notesSlides/notesSlide7.xml><?xml version="1.0" encoding="utf-8"?>
+<p:notes xmlns:a="http://schemas.openxmlformats.org/drawingml/2006/main" xmlns:r="http://schemas.openxmlformats.org/officeDocument/2006/relationships" xmlns:p="http://schemas.openxmlformats.org/presentationml/2006/main">
+  <p:cSld>
+    <p:spTree>
+      <p:nvGrpSpPr>
+        <p:cNvPr id="1" name=""/>
+        <p:cNvGrpSpPr/>
+        <p:nvPr/>
+      </p:nvGrpSpPr>
+      <p:grpSpPr>
+        <a:xfrm>
+          <a:off x="0" y="0"/>
+          <a:ext cx="0" cy="0"/>
+          <a:chOff x="0" y="0"/>
+          <a:chExt cx="0" cy="0"/>
+        </a:xfrm>
+      </p:grpSpPr>
+      <p:sp>
+        <p:nvSpPr>
+          <p:cNvPr id="2" name="Folienbildplatzhalter 1"/>
+          <p:cNvSpPr>
+            <a:spLocks noGrp="1" noRot="1" noChangeAspect="1"/>
+          </p:cNvSpPr>
+          <p:nvPr>
+            <p:ph type="sldImg"/>
+          </p:nvPr>
+        </p:nvSpPr>
+        <p:spPr/>
+      </p:sp>
+      <p:sp>
+        <p:nvSpPr>
+          <p:cNvPr id="3" name="Notizenplatzhalter 2"/>
+          <p:cNvSpPr>
+            <a:spLocks noGrp="1"/>
+          </p:cNvSpPr>
+          <p:nvPr>
+            <p:ph type="body" idx="1"/>
+          </p:nvPr>
+        </p:nvSpPr>
+        <p:spPr/>
+        <p:txBody>
+          <a:bodyPr/>
+          <a:lstStyle/>
+          <a:p>
+            <a:r>
+              <a:rPr lang="de-CH" dirty="0"/>
+              <a:t>https://developer.mozilla.org/de/docs/Web/JavaScript/Reference/Global_Objects/Array/forEach</a:t>
+            </a:r>
+          </a:p>
+        </p:txBody>
+      </p:sp>
+      <p:sp>
+        <p:nvSpPr>
+          <p:cNvPr id="4" name="Foliennummernplatzhalter 3"/>
+          <p:cNvSpPr>
+            <a:spLocks noGrp="1"/>
+          </p:cNvSpPr>
+          <p:nvPr>
+            <p:ph type="sldNum" sz="quarter" idx="10"/>
+          </p:nvPr>
+        </p:nvSpPr>
+        <p:spPr/>
+        <p:txBody>
+          <a:bodyPr/>
+          <a:lstStyle/>
+          <a:p>
+            <a:fld id="{44771577-2C5A-D741-B4F8-1C3FD3942A98}" type="slidenum">
+              <a:rPr lang="en-GB" smtClean="0"/>
+              <a:t>10</a:t>
+            </a:fld>
+            <a:endParaRPr lang="en-GB"/>
+          </a:p>
+        </p:txBody>
+      </p:sp>
+    </p:spTree>
+    <p:extLst>
+      <p:ext uri="{BB962C8B-B14F-4D97-AF65-F5344CB8AC3E}">
+        <p14:creationId xmlns:p14="http://schemas.microsoft.com/office/powerpoint/2010/main" val="1294132467"/>
+      </p:ext>
+    </p:extLst>
+  </p:cSld>
+  <p:clrMapOvr>
+    <a:masterClrMapping/>
+  </p:clrMapOvr>
+</p:notes>
+</file>
+
+<file path=ppt/notesSlides/notesSlide8.xml><?xml version="1.0" encoding="utf-8"?>
+<p:notes xmlns:a="http://schemas.openxmlformats.org/drawingml/2006/main" xmlns:r="http://schemas.openxmlformats.org/officeDocument/2006/relationships" xmlns:p="http://schemas.openxmlformats.org/presentationml/2006/main">
+  <p:cSld>
+    <p:spTree>
+      <p:nvGrpSpPr>
+        <p:cNvPr id="1" name=""/>
+        <p:cNvGrpSpPr/>
+        <p:nvPr/>
+      </p:nvGrpSpPr>
+      <p:grpSpPr>
+        <a:xfrm>
+          <a:off x="0" y="0"/>
+          <a:ext cx="0" cy="0"/>
+          <a:chOff x="0" y="0"/>
+          <a:chExt cx="0" cy="0"/>
+        </a:xfrm>
+      </p:grpSpPr>
+      <p:sp>
+        <p:nvSpPr>
+          <p:cNvPr id="2" name="Folienbildplatzhalter 1"/>
+          <p:cNvSpPr>
+            <a:spLocks noGrp="1" noRot="1" noChangeAspect="1"/>
+          </p:cNvSpPr>
+          <p:nvPr>
+            <p:ph type="sldImg"/>
+          </p:nvPr>
+        </p:nvSpPr>
+        <p:spPr/>
+      </p:sp>
+      <p:sp>
+        <p:nvSpPr>
+          <p:cNvPr id="3" name="Notizenplatzhalter 2"/>
+          <p:cNvSpPr>
+            <a:spLocks noGrp="1"/>
+          </p:cNvSpPr>
+          <p:nvPr>
+            <p:ph type="body" idx="1"/>
+          </p:nvPr>
+        </p:nvSpPr>
+        <p:spPr/>
+        <p:txBody>
+          <a:bodyPr/>
+          <a:lstStyle/>
+          <a:p>
+            <a:r>
+              <a:rPr lang="de-CH" dirty="0"/>
+              <a:t>Diese Funktionen können auch auf anderen Elementen ausgeführt werden</a:t>
+            </a:r>
+          </a:p>
+        </p:txBody>
+      </p:sp>
+      <p:sp>
+        <p:nvSpPr>
+          <p:cNvPr id="4" name="Foliennummernplatzhalter 3"/>
+          <p:cNvSpPr>
+            <a:spLocks noGrp="1"/>
+          </p:cNvSpPr>
+          <p:nvPr>
+            <p:ph type="sldNum" sz="quarter" idx="10"/>
+          </p:nvPr>
+        </p:nvSpPr>
+        <p:spPr/>
+        <p:txBody>
+          <a:bodyPr/>
+          <a:lstStyle/>
+          <a:p>
+            <a:fld id="{44771577-2C5A-D741-B4F8-1C3FD3942A98}" type="slidenum">
+              <a:rPr lang="en-GB" smtClean="0"/>
+              <a:t>11</a:t>
             </a:fld>
             <a:endParaRPr lang="en-GB"/>
           </a:p>
@@ -1196,6 +1497,93 @@
     <p:extLst>
       <p:ext uri="{BB962C8B-B14F-4D97-AF65-F5344CB8AC3E}">
         <p14:creationId xmlns:p14="http://schemas.microsoft.com/office/powerpoint/2010/main" val="2865203434"/>
+      </p:ext>
+    </p:extLst>
+  </p:cSld>
+  <p:clrMapOvr>
+    <a:masterClrMapping/>
+  </p:clrMapOvr>
+</p:notes>
+</file>
+
+<file path=ppt/notesSlides/notesSlide9.xml><?xml version="1.0" encoding="utf-8"?>
+<p:notes xmlns:a="http://schemas.openxmlformats.org/drawingml/2006/main" xmlns:r="http://schemas.openxmlformats.org/officeDocument/2006/relationships" xmlns:p="http://schemas.openxmlformats.org/presentationml/2006/main">
+  <p:cSld>
+    <p:spTree>
+      <p:nvGrpSpPr>
+        <p:cNvPr id="1" name=""/>
+        <p:cNvGrpSpPr/>
+        <p:nvPr/>
+      </p:nvGrpSpPr>
+      <p:grpSpPr>
+        <a:xfrm>
+          <a:off x="0" y="0"/>
+          <a:ext cx="0" cy="0"/>
+          <a:chOff x="0" y="0"/>
+          <a:chExt cx="0" cy="0"/>
+        </a:xfrm>
+      </p:grpSpPr>
+      <p:sp>
+        <p:nvSpPr>
+          <p:cNvPr id="2" name="Folienbildplatzhalter 1"/>
+          <p:cNvSpPr>
+            <a:spLocks noGrp="1" noRot="1" noChangeAspect="1"/>
+          </p:cNvSpPr>
+          <p:nvPr>
+            <p:ph type="sldImg"/>
+          </p:nvPr>
+        </p:nvSpPr>
+        <p:spPr/>
+      </p:sp>
+      <p:sp>
+        <p:nvSpPr>
+          <p:cNvPr id="3" name="Notizenplatzhalter 2"/>
+          <p:cNvSpPr>
+            <a:spLocks noGrp="1"/>
+          </p:cNvSpPr>
+          <p:nvPr>
+            <p:ph type="body" idx="1"/>
+          </p:nvPr>
+        </p:nvSpPr>
+        <p:spPr/>
+        <p:txBody>
+          <a:bodyPr/>
+          <a:lstStyle/>
+          <a:p>
+            <a:r>
+              <a:rPr lang="de-CH" dirty="0"/>
+              <a:t>https://www.w3schools.com/js/js_array_methods.asp </a:t>
+            </a:r>
+          </a:p>
+        </p:txBody>
+      </p:sp>
+      <p:sp>
+        <p:nvSpPr>
+          <p:cNvPr id="4" name="Foliennummernplatzhalter 3"/>
+          <p:cNvSpPr>
+            <a:spLocks noGrp="1"/>
+          </p:cNvSpPr>
+          <p:nvPr>
+            <p:ph type="sldNum" sz="quarter" idx="10"/>
+          </p:nvPr>
+        </p:nvSpPr>
+        <p:spPr/>
+        <p:txBody>
+          <a:bodyPr/>
+          <a:lstStyle/>
+          <a:p>
+            <a:fld id="{44771577-2C5A-D741-B4F8-1C3FD3942A98}" type="slidenum">
+              <a:rPr lang="en-GB" smtClean="0"/>
+              <a:t>16</a:t>
+            </a:fld>
+            <a:endParaRPr lang="en-GB"/>
+          </a:p>
+        </p:txBody>
+      </p:sp>
+    </p:spTree>
+    <p:extLst>
+      <p:ext uri="{BB962C8B-B14F-4D97-AF65-F5344CB8AC3E}">
+        <p14:creationId xmlns:p14="http://schemas.microsoft.com/office/powerpoint/2010/main" val="3629272503"/>
       </p:ext>
     </p:extLst>
   </p:cSld>
@@ -4194,28 +4582,8 @@
           <a:lstStyle/>
           <a:p>
             <a:r>
-              <a:rPr lang="de-CH" dirty="0" err="1"/>
-              <a:t>If</a:t>
-            </a:r>
-            <a:r>
-              <a:rPr lang="de-CH" dirty="0"/>
-              <a:t>, </a:t>
-            </a:r>
-            <a:r>
-              <a:rPr lang="de-CH" dirty="0" err="1"/>
-              <a:t>else</a:t>
-            </a:r>
-            <a:r>
-              <a:rPr lang="de-CH" dirty="0"/>
-              <a:t> </a:t>
-            </a:r>
-            <a:r>
-              <a:rPr lang="de-CH" dirty="0" err="1"/>
-              <a:t>if</a:t>
-            </a:r>
-            <a:r>
-              <a:rPr lang="de-CH" dirty="0"/>
-              <a:t>, Switch</a:t>
+              <a:rPr lang="de-CH" dirty="0"/>
+              <a:t>Loops</a:t>
             </a:r>
           </a:p>
         </p:txBody>
@@ -4235,14 +4603,49 @@
           <a:bodyPr/>
           <a:lstStyle/>
           <a:p>
-            <a:pPr marL="0" indent="0">
-              <a:buNone/>
-            </a:pPr>
             <a:r>
               <a:rPr lang="de-CH" dirty="0" err="1">
                 <a:latin typeface="Consolas" panose="020B0609020204030204" pitchFamily="49" charset="0"/>
               </a:rPr>
-              <a:t>if</a:t>
+              <a:t>for</a:t>
+            </a:r>
+            <a:r>
+              <a:rPr lang="de-CH" dirty="0">
+                <a:latin typeface="Consolas" panose="020B0609020204030204" pitchFamily="49" charset="0"/>
+              </a:rPr>
+              <a:t> (i = </a:t>
+            </a:r>
+            <a:r>
+              <a:rPr lang="de-CH">
+                <a:latin typeface="Consolas" panose="020B0609020204030204" pitchFamily="49" charset="0"/>
+              </a:rPr>
+              <a:t>0; i </a:t>
+            </a:r>
+            <a:r>
+              <a:rPr lang="de-CH" dirty="0">
+                <a:latin typeface="Consolas" panose="020B0609020204030204" pitchFamily="49" charset="0"/>
+              </a:rPr>
+              <a:t>&lt; </a:t>
+            </a:r>
+            <a:r>
+              <a:rPr lang="de-CH">
+                <a:latin typeface="Consolas" panose="020B0609020204030204" pitchFamily="49" charset="0"/>
+              </a:rPr>
+              <a:t>10; i</a:t>
+            </a:r>
+            <a:r>
+              <a:rPr lang="de-CH" dirty="0">
+                <a:latin typeface="Consolas" panose="020B0609020204030204" pitchFamily="49" charset="0"/>
+              </a:rPr>
+              <a:t>++){console.log(i);}</a:t>
+            </a:r>
+          </a:p>
+          <a:p>
+            <a:r>
+              <a:rPr lang="de-CH" dirty="0" err="1">
+                <a:latin typeface="Consolas" panose="020B0609020204030204" pitchFamily="49" charset="0"/>
+              </a:rPr>
+              <a:t>for</a:t>
             </a:r>
             <a:r>
               <a:rPr lang="de-CH" dirty="0">
@@ -4254,62 +4657,126 @@
               <a:rPr lang="de-CH" dirty="0" err="1">
                 <a:latin typeface="Consolas" panose="020B0609020204030204" pitchFamily="49" charset="0"/>
               </a:rPr>
+              <a:t>elem</a:t>
+            </a:r>
+            <a:r>
+              <a:rPr lang="de-CH" dirty="0">
+                <a:latin typeface="Consolas" panose="020B0609020204030204" pitchFamily="49" charset="0"/>
+              </a:rPr>
+              <a:t> in </a:t>
+            </a:r>
+            <a:r>
+              <a:rPr lang="de-CH" dirty="0" err="1">
+                <a:latin typeface="Consolas" panose="020B0609020204030204" pitchFamily="49" charset="0"/>
+              </a:rPr>
+              <a:t>array</a:t>
+            </a:r>
+            <a:r>
+              <a:rPr lang="de-CH" dirty="0">
+                <a:latin typeface="Consolas" panose="020B0609020204030204" pitchFamily="49" charset="0"/>
+              </a:rPr>
+              <a:t>){console.log(x);}</a:t>
+            </a:r>
+          </a:p>
+          <a:p>
+            <a:r>
+              <a:rPr lang="de-CH" dirty="0" err="1">
+                <a:latin typeface="Consolas" panose="020B0609020204030204" pitchFamily="49" charset="0"/>
+              </a:rPr>
+              <a:t>while</a:t>
+            </a:r>
+            <a:r>
+              <a:rPr lang="de-CH" dirty="0">
+                <a:latin typeface="Consolas" panose="020B0609020204030204" pitchFamily="49" charset="0"/>
+              </a:rPr>
+              <a:t> (</a:t>
+            </a:r>
+            <a:r>
+              <a:rPr lang="de-CH" dirty="0" err="1">
+                <a:latin typeface="Consolas" panose="020B0609020204030204" pitchFamily="49" charset="0"/>
+              </a:rPr>
               <a:t>true</a:t>
             </a:r>
             <a:r>
               <a:rPr lang="de-CH" dirty="0">
                 <a:latin typeface="Consolas" panose="020B0609020204030204" pitchFamily="49" charset="0"/>
               </a:rPr>
-              <a:t>){</a:t>
-            </a:r>
-          </a:p>
-          <a:p>
-            <a:pPr marL="0" indent="0">
-              <a:buNone/>
-            </a:pPr>
-            <a:r>
-              <a:rPr lang="de-CH" dirty="0">
-                <a:latin typeface="Consolas" panose="020B0609020204030204" pitchFamily="49" charset="0"/>
-              </a:rPr>
-              <a:t>	do </a:t>
+              <a:t>){console.log(i)}</a:t>
+            </a:r>
+          </a:p>
+          <a:p>
+            <a:r>
+              <a:rPr lang="de-CH" dirty="0">
+                <a:latin typeface="Consolas" panose="020B0609020204030204" pitchFamily="49" charset="0"/>
+              </a:rPr>
+              <a:t>do {console.log(i)} </a:t>
             </a:r>
             <a:r>
               <a:rPr lang="de-CH" dirty="0" err="1">
                 <a:latin typeface="Consolas" panose="020B0609020204030204" pitchFamily="49" charset="0"/>
               </a:rPr>
-              <a:t>stuff</a:t>
-            </a:r>
+              <a:t>while</a:t>
+            </a:r>
+            <a:r>
+              <a:rPr lang="de-CH" dirty="0">
+                <a:latin typeface="Consolas" panose="020B0609020204030204" pitchFamily="49" charset="0"/>
+              </a:rPr>
+              <a:t>(</a:t>
+            </a:r>
+            <a:r>
+              <a:rPr lang="de-CH" dirty="0" err="1">
+                <a:latin typeface="Consolas" panose="020B0609020204030204" pitchFamily="49" charset="0"/>
+              </a:rPr>
+              <a:t>true</a:t>
+            </a:r>
+            <a:r>
+              <a:rPr lang="de-CH" dirty="0">
+                <a:latin typeface="Consolas" panose="020B0609020204030204" pitchFamily="49" charset="0"/>
+              </a:rPr>
+              <a:t>);</a:t>
+            </a:r>
+          </a:p>
+          <a:p>
             <a:endParaRPr lang="de-CH" dirty="0">
               <a:latin typeface="Consolas" panose="020B0609020204030204" pitchFamily="49" charset="0"/>
             </a:endParaRPr>
           </a:p>
           <a:p>
-            <a:pPr marL="0" indent="0">
-              <a:buNone/>
-            </a:pPr>
-            <a:r>
-              <a:rPr lang="de-CH" dirty="0">
-                <a:latin typeface="Consolas" panose="020B0609020204030204" pitchFamily="49" charset="0"/>
-              </a:rPr>
-              <a:t>}</a:t>
-            </a:r>
             <a:r>
               <a:rPr lang="de-CH" dirty="0" err="1">
                 <a:latin typeface="Consolas" panose="020B0609020204030204" pitchFamily="49" charset="0"/>
               </a:rPr>
-              <a:t>else</a:t>
-            </a:r>
-            <a:r>
-              <a:rPr lang="de-CH" dirty="0">
-                <a:latin typeface="Consolas" panose="020B0609020204030204" pitchFamily="49" charset="0"/>
-              </a:rPr>
-              <a:t> </a:t>
+              <a:t>array.forEach</a:t>
+            </a:r>
+            <a:r>
+              <a:rPr lang="de-CH" dirty="0">
+                <a:latin typeface="Consolas" panose="020B0609020204030204" pitchFamily="49" charset="0"/>
+              </a:rPr>
+              <a:t>((</a:t>
             </a:r>
             <a:r>
               <a:rPr lang="de-CH" dirty="0" err="1">
                 <a:latin typeface="Consolas" panose="020B0609020204030204" pitchFamily="49" charset="0"/>
               </a:rPr>
-              <a:t>if</a:t>
+              <a:t>e,i</a:t>
+            </a:r>
+            <a:r>
+              <a:rPr lang="de-CH" dirty="0">
+                <a:latin typeface="Consolas" panose="020B0609020204030204" pitchFamily="49" charset="0"/>
+              </a:rPr>
+              <a:t>) =&gt; console.log(e)); //</a:t>
+            </a:r>
+            <a:r>
+              <a:rPr lang="de-CH" dirty="0"/>
+              <a:t>(ES6)</a:t>
+            </a:r>
+          </a:p>
+          <a:p>
+            <a:r>
+              <a:rPr lang="de-CH" dirty="0" err="1">
+                <a:latin typeface="Consolas" panose="020B0609020204030204" pitchFamily="49" charset="0"/>
+              </a:rPr>
+              <a:t>array.forEach</a:t>
             </a:r>
             <a:r>
               <a:rPr lang="de-CH" dirty="0">
@@ -4321,146 +4788,37 @@
               <a:rPr lang="de-CH" dirty="0" err="1">
                 <a:latin typeface="Consolas" panose="020B0609020204030204" pitchFamily="49" charset="0"/>
               </a:rPr>
-              <a:t>true</a:t>
-            </a:r>
-            <a:r>
-              <a:rPr lang="de-CH" dirty="0">
-                <a:latin typeface="Consolas" panose="020B0609020204030204" pitchFamily="49" charset="0"/>
-              </a:rPr>
-              <a:t>){</a:t>
-            </a:r>
-          </a:p>
-          <a:p>
-            <a:pPr marL="0" indent="0">
-              <a:buNone/>
-            </a:pPr>
-            <a:r>
-              <a:rPr lang="de-CH" dirty="0">
-                <a:latin typeface="Consolas" panose="020B0609020204030204" pitchFamily="49" charset="0"/>
-              </a:rPr>
-              <a:t>	do </a:t>
+              <a:t>function</a:t>
+            </a:r>
+            <a:r>
+              <a:rPr lang="de-CH" dirty="0">
+                <a:latin typeface="Consolas" panose="020B0609020204030204" pitchFamily="49" charset="0"/>
+              </a:rPr>
+              <a:t>(</a:t>
             </a:r>
             <a:r>
               <a:rPr lang="de-CH" dirty="0" err="1">
                 <a:latin typeface="Consolas" panose="020B0609020204030204" pitchFamily="49" charset="0"/>
               </a:rPr>
-              <a:t>other</a:t>
-            </a:r>
-            <a:r>
-              <a:rPr lang="de-CH" dirty="0">
-                <a:latin typeface="Consolas" panose="020B0609020204030204" pitchFamily="49" charset="0"/>
-              </a:rPr>
-              <a:t> </a:t>
-            </a:r>
-            <a:r>
-              <a:rPr lang="de-CH" dirty="0" err="1">
-                <a:latin typeface="Consolas" panose="020B0609020204030204" pitchFamily="49" charset="0"/>
-              </a:rPr>
-              <a:t>stuff</a:t>
-            </a:r>
-            <a:endParaRPr lang="de-CH" dirty="0">
-              <a:latin typeface="Consolas" panose="020B0609020204030204" pitchFamily="49" charset="0"/>
-            </a:endParaRPr>
-          </a:p>
-          <a:p>
-            <a:pPr marL="0" indent="0">
-              <a:buNone/>
-            </a:pPr>
-            <a:r>
-              <a:rPr lang="de-CH" dirty="0">
-                <a:latin typeface="Consolas" panose="020B0609020204030204" pitchFamily="49" charset="0"/>
-              </a:rPr>
-              <a:t>}</a:t>
-            </a:r>
-            <a:r>
-              <a:rPr lang="de-CH" dirty="0" err="1">
-                <a:latin typeface="Consolas" panose="020B0609020204030204" pitchFamily="49" charset="0"/>
-              </a:rPr>
-              <a:t>else</a:t>
-            </a:r>
-            <a:r>
-              <a:rPr lang="de-CH" dirty="0">
-                <a:latin typeface="Consolas" panose="020B0609020204030204" pitchFamily="49" charset="0"/>
-              </a:rPr>
-              <a:t> {</a:t>
-            </a:r>
-          </a:p>
-          <a:p>
-            <a:pPr marL="0" indent="0">
-              <a:buNone/>
-            </a:pPr>
-            <a:r>
-              <a:rPr lang="de-CH" dirty="0">
-                <a:latin typeface="Consolas" panose="020B0609020204030204" pitchFamily="49" charset="0"/>
-              </a:rPr>
-              <a:t>	do </a:t>
-            </a:r>
-            <a:r>
-              <a:rPr lang="de-CH" dirty="0" err="1">
-                <a:latin typeface="Consolas" panose="020B0609020204030204" pitchFamily="49" charset="0"/>
-              </a:rPr>
-              <a:t>everything</a:t>
-            </a:r>
-            <a:r>
-              <a:rPr lang="de-CH" dirty="0">
-                <a:latin typeface="Consolas" panose="020B0609020204030204" pitchFamily="49" charset="0"/>
-              </a:rPr>
-              <a:t> </a:t>
-            </a:r>
-            <a:r>
-              <a:rPr lang="de-CH" dirty="0" err="1">
-                <a:latin typeface="Consolas" panose="020B0609020204030204" pitchFamily="49" charset="0"/>
-              </a:rPr>
-              <a:t>else</a:t>
-            </a:r>
-            <a:endParaRPr lang="de-CH" dirty="0">
-              <a:latin typeface="Consolas" panose="020B0609020204030204" pitchFamily="49" charset="0"/>
-            </a:endParaRPr>
-          </a:p>
-          <a:p>
-            <a:pPr marL="0" indent="0">
-              <a:buNone/>
-            </a:pPr>
-            <a:r>
-              <a:rPr lang="de-CH" dirty="0">
-                <a:latin typeface="Consolas" panose="020B0609020204030204" pitchFamily="49" charset="0"/>
-              </a:rPr>
-              <a:t>}</a:t>
-            </a:r>
-          </a:p>
-          <a:p>
-            <a:endParaRPr lang="de-CH" dirty="0"/>
-          </a:p>
-        </p:txBody>
-      </p:sp>
-      <p:pic>
-        <p:nvPicPr>
-          <p:cNvPr id="4" name="Picture 3"/>
-          <p:cNvPicPr>
-            <a:picLocks noChangeAspect="1"/>
-          </p:cNvPicPr>
-          <p:nvPr/>
-        </p:nvPicPr>
-        <p:blipFill>
-          <a:blip r:embed="rId2"/>
-          <a:stretch>
-            <a:fillRect/>
-          </a:stretch>
-        </p:blipFill>
-        <p:spPr>
-          <a:xfrm>
-            <a:off x="7181850" y="1825625"/>
-            <a:ext cx="3505200" cy="3443052"/>
-          </a:xfrm>
-          <a:prstGeom prst="rect">
-            <a:avLst/>
-          </a:prstGeom>
-        </p:spPr>
-      </p:pic>
+              <a:t>e,i</a:t>
+            </a:r>
+            <a:r>
+              <a:rPr lang="de-CH" dirty="0">
+                <a:latin typeface="Consolas" panose="020B0609020204030204" pitchFamily="49" charset="0"/>
+              </a:rPr>
+              <a:t>){console.log(e)});</a:t>
+            </a:r>
+            <a:r>
+              <a:rPr lang="de-CH" dirty="0"/>
+              <a:t> //(ES5)</a:t>
+            </a:r>
+          </a:p>
+        </p:txBody>
+      </p:sp>
     </p:spTree>
     <p:extLst>
       <p:ext uri="{BB962C8B-B14F-4D97-AF65-F5344CB8AC3E}">
-        <p14:creationId xmlns:p14="http://schemas.microsoft.com/office/powerpoint/2010/main" val="1450258862"/>
+        <p14:creationId xmlns:p14="http://schemas.microsoft.com/office/powerpoint/2010/main" val="702184386"/>
       </p:ext>
     </p:extLst>
   </p:cSld>
@@ -4504,7 +4862,23 @@
           <a:p>
             <a:r>
               <a:rPr lang="de-CH" dirty="0"/>
-              <a:t>Loops</a:t>
+              <a:t>Elemente vom </a:t>
+            </a:r>
+            <a:r>
+              <a:rPr lang="de-CH" dirty="0" err="1"/>
+              <a:t>Document</a:t>
+            </a:r>
+            <a:r>
+              <a:rPr lang="de-CH" dirty="0"/>
+              <a:t> </a:t>
+            </a:r>
+            <a:r>
+              <a:rPr lang="de-CH" dirty="0" err="1"/>
+              <a:t>Object</a:t>
+            </a:r>
+            <a:r>
+              <a:rPr lang="de-CH" dirty="0"/>
+              <a:t> Model</a:t>
             </a:r>
           </a:p>
         </p:txBody>
@@ -4528,136 +4902,8 @@
               <a:rPr lang="de-CH" dirty="0" err="1">
                 <a:latin typeface="Consolas" panose="020B0609020204030204" pitchFamily="49" charset="0"/>
               </a:rPr>
-              <a:t>for</a:t>
-            </a:r>
-            <a:r>
-              <a:rPr lang="de-CH" dirty="0">
-                <a:latin typeface="Consolas" panose="020B0609020204030204" pitchFamily="49" charset="0"/>
-              </a:rPr>
-              <a:t> (i = </a:t>
-            </a:r>
-            <a:r>
-              <a:rPr lang="de-CH">
-                <a:latin typeface="Consolas" panose="020B0609020204030204" pitchFamily="49" charset="0"/>
-              </a:rPr>
-              <a:t>0; i </a:t>
-            </a:r>
-            <a:r>
-              <a:rPr lang="de-CH" dirty="0">
-                <a:latin typeface="Consolas" panose="020B0609020204030204" pitchFamily="49" charset="0"/>
-              </a:rPr>
-              <a:t>&lt; </a:t>
-            </a:r>
-            <a:r>
-              <a:rPr lang="de-CH">
-                <a:latin typeface="Consolas" panose="020B0609020204030204" pitchFamily="49" charset="0"/>
-              </a:rPr>
-              <a:t>10; i</a:t>
-            </a:r>
-            <a:r>
-              <a:rPr lang="de-CH" dirty="0">
-                <a:latin typeface="Consolas" panose="020B0609020204030204" pitchFamily="49" charset="0"/>
-              </a:rPr>
-              <a:t>++){console.log(i);}</a:t>
-            </a:r>
-          </a:p>
-          <a:p>
-            <a:r>
-              <a:rPr lang="de-CH" dirty="0" err="1">
-                <a:latin typeface="Consolas" panose="020B0609020204030204" pitchFamily="49" charset="0"/>
-              </a:rPr>
-              <a:t>for</a:t>
-            </a:r>
-            <a:r>
-              <a:rPr lang="de-CH" dirty="0">
-                <a:latin typeface="Consolas" panose="020B0609020204030204" pitchFamily="49" charset="0"/>
-              </a:rPr>
-              <a:t>(</a:t>
-            </a:r>
-            <a:r>
-              <a:rPr lang="de-CH" dirty="0" err="1">
-                <a:latin typeface="Consolas" panose="020B0609020204030204" pitchFamily="49" charset="0"/>
-              </a:rPr>
-              <a:t>elem</a:t>
-            </a:r>
-            <a:r>
-              <a:rPr lang="de-CH" dirty="0">
-                <a:latin typeface="Consolas" panose="020B0609020204030204" pitchFamily="49" charset="0"/>
-              </a:rPr>
-              <a:t> in </a:t>
-            </a:r>
-            <a:r>
-              <a:rPr lang="de-CH" dirty="0" err="1">
-                <a:latin typeface="Consolas" panose="020B0609020204030204" pitchFamily="49" charset="0"/>
-              </a:rPr>
-              <a:t>array</a:t>
-            </a:r>
-            <a:r>
-              <a:rPr lang="de-CH" dirty="0">
-                <a:latin typeface="Consolas" panose="020B0609020204030204" pitchFamily="49" charset="0"/>
-              </a:rPr>
-              <a:t>){console.log(x);}</a:t>
-            </a:r>
-          </a:p>
-          <a:p>
-            <a:r>
-              <a:rPr lang="de-CH" dirty="0" err="1">
-                <a:latin typeface="Consolas" panose="020B0609020204030204" pitchFamily="49" charset="0"/>
-              </a:rPr>
-              <a:t>while</a:t>
-            </a:r>
-            <a:r>
-              <a:rPr lang="de-CH" dirty="0">
-                <a:latin typeface="Consolas" panose="020B0609020204030204" pitchFamily="49" charset="0"/>
-              </a:rPr>
-              <a:t> (</a:t>
-            </a:r>
-            <a:r>
-              <a:rPr lang="de-CH" dirty="0" err="1">
-                <a:latin typeface="Consolas" panose="020B0609020204030204" pitchFamily="49" charset="0"/>
-              </a:rPr>
-              <a:t>true</a:t>
-            </a:r>
-            <a:r>
-              <a:rPr lang="de-CH" dirty="0">
-                <a:latin typeface="Consolas" panose="020B0609020204030204" pitchFamily="49" charset="0"/>
-              </a:rPr>
-              <a:t>){console.log(i)}</a:t>
-            </a:r>
-          </a:p>
-          <a:p>
-            <a:r>
-              <a:rPr lang="de-CH" dirty="0">
-                <a:latin typeface="Consolas" panose="020B0609020204030204" pitchFamily="49" charset="0"/>
-              </a:rPr>
-              <a:t>do {console.log(i)} </a:t>
-            </a:r>
-            <a:r>
-              <a:rPr lang="de-CH" dirty="0" err="1">
-                <a:latin typeface="Consolas" panose="020B0609020204030204" pitchFamily="49" charset="0"/>
-              </a:rPr>
-              <a:t>while</a:t>
-            </a:r>
-            <a:r>
-              <a:rPr lang="de-CH" dirty="0">
-                <a:latin typeface="Consolas" panose="020B0609020204030204" pitchFamily="49" charset="0"/>
-              </a:rPr>
-              <a:t>(</a:t>
-            </a:r>
-            <a:r>
-              <a:rPr lang="de-CH" dirty="0" err="1">
-                <a:latin typeface="Consolas" panose="020B0609020204030204" pitchFamily="49" charset="0"/>
-              </a:rPr>
-              <a:t>true</a:t>
-            </a:r>
-            <a:r>
-              <a:rPr lang="de-CH" dirty="0">
-                <a:latin typeface="Consolas" panose="020B0609020204030204" pitchFamily="49" charset="0"/>
-              </a:rPr>
-              <a:t>);</a:t>
-            </a:r>
-          </a:p>
-          <a:p>
+              <a:t>document</a:t>
+            </a:r>
             <a:endParaRPr lang="de-CH" dirty="0">
               <a:latin typeface="Consolas" panose="020B0609020204030204" pitchFamily="49" charset="0"/>
             </a:endParaRPr>
@@ -4667,79 +4913,166 @@
               <a:rPr lang="de-CH" dirty="0" err="1">
                 <a:latin typeface="Consolas" panose="020B0609020204030204" pitchFamily="49" charset="0"/>
               </a:rPr>
-              <a:t>array.forEach</a:t>
-            </a:r>
-            <a:r>
-              <a:rPr lang="de-CH" dirty="0">
-                <a:latin typeface="Consolas" panose="020B0609020204030204" pitchFamily="49" charset="0"/>
-              </a:rPr>
-              <a:t>((</a:t>
+              <a:t>document.getElementsByTagName</a:t>
+            </a:r>
+            <a:r>
+              <a:rPr lang="de-CH" dirty="0">
+                <a:latin typeface="Consolas" panose="020B0609020204030204" pitchFamily="49" charset="0"/>
+              </a:rPr>
+              <a:t>(’</a:t>
             </a:r>
             <a:r>
               <a:rPr lang="de-CH" dirty="0" err="1">
                 <a:latin typeface="Consolas" panose="020B0609020204030204" pitchFamily="49" charset="0"/>
               </a:rPr>
-              <a:t>e,i</a:t>
-            </a:r>
-            <a:r>
-              <a:rPr lang="de-CH" dirty="0">
-                <a:latin typeface="Consolas" panose="020B0609020204030204" pitchFamily="49" charset="0"/>
-              </a:rPr>
-              <a:t>) =&gt; console.log(e)); //</a:t>
-            </a:r>
-            <a:r>
-              <a:rPr lang="de-CH" dirty="0"/>
-              <a:t>(ES6)</a:t>
-            </a:r>
-          </a:p>
-          <a:p>
+              <a:t>Tagname</a:t>
+            </a:r>
+            <a:r>
+              <a:rPr lang="de-CH" dirty="0">
+                <a:latin typeface="Consolas" panose="020B0609020204030204" pitchFamily="49" charset="0"/>
+              </a:rPr>
+              <a:t>’); //</a:t>
+            </a:r>
             <a:r>
               <a:rPr lang="de-CH" dirty="0" err="1">
                 <a:latin typeface="Consolas" panose="020B0609020204030204" pitchFamily="49" charset="0"/>
               </a:rPr>
-              <a:t>array.forEach</a:t>
-            </a:r>
-            <a:r>
-              <a:rPr lang="de-CH" dirty="0">
-                <a:latin typeface="Consolas" panose="020B0609020204030204" pitchFamily="49" charset="0"/>
-              </a:rPr>
-              <a:t>(</a:t>
+              <a:t>returns</a:t>
+            </a:r>
+            <a:r>
+              <a:rPr lang="de-CH" dirty="0">
+                <a:latin typeface="Consolas" panose="020B0609020204030204" pitchFamily="49" charset="0"/>
+              </a:rPr>
+              <a:t> </a:t>
             </a:r>
             <a:r>
               <a:rPr lang="de-CH" dirty="0" err="1">
                 <a:latin typeface="Consolas" panose="020B0609020204030204" pitchFamily="49" charset="0"/>
               </a:rPr>
-              <a:t>function</a:t>
-            </a:r>
-            <a:r>
-              <a:rPr lang="de-CH" dirty="0">
-                <a:latin typeface="Consolas" panose="020B0609020204030204" pitchFamily="49" charset="0"/>
-              </a:rPr>
-              <a:t>(</a:t>
-            </a:r>
+              <a:t>html</a:t>
+            </a:r>
+            <a:r>
+              <a:rPr lang="de-CH" dirty="0">
+                <a:latin typeface="Consolas" panose="020B0609020204030204" pitchFamily="49" charset="0"/>
+              </a:rPr>
+              <a:t> Collection</a:t>
+            </a:r>
+          </a:p>
+          <a:p>
             <a:r>
               <a:rPr lang="de-CH" dirty="0" err="1">
                 <a:latin typeface="Consolas" panose="020B0609020204030204" pitchFamily="49" charset="0"/>
               </a:rPr>
-              <a:t>e,i</a:t>
-            </a:r>
-            <a:r>
-              <a:rPr lang="de-CH" dirty="0">
-                <a:latin typeface="Consolas" panose="020B0609020204030204" pitchFamily="49" charset="0"/>
-              </a:rPr>
-              <a:t>){console.log(e)});</a:t>
-            </a:r>
-            <a:r>
-              <a:rPr lang="de-CH" dirty="0"/>
-              <a:t> //(ES5)</a:t>
-            </a:r>
+              <a:t>document.getElementsByClassName</a:t>
+            </a:r>
+            <a:r>
+              <a:rPr lang="de-CH" dirty="0">
+                <a:latin typeface="Consolas" panose="020B0609020204030204" pitchFamily="49" charset="0"/>
+              </a:rPr>
+              <a:t>(‘</a:t>
+            </a:r>
+            <a:r>
+              <a:rPr lang="de-CH" dirty="0" err="1">
+                <a:latin typeface="Consolas" panose="020B0609020204030204" pitchFamily="49" charset="0"/>
+              </a:rPr>
+              <a:t>ClassName</a:t>
+            </a:r>
+            <a:r>
+              <a:rPr lang="de-CH" dirty="0">
+                <a:latin typeface="Consolas" panose="020B0609020204030204" pitchFamily="49" charset="0"/>
+              </a:rPr>
+              <a:t>’); //</a:t>
+            </a:r>
+            <a:r>
+              <a:rPr lang="de-CH" dirty="0" err="1">
+                <a:latin typeface="Consolas" panose="020B0609020204030204" pitchFamily="49" charset="0"/>
+              </a:rPr>
+              <a:t>returns</a:t>
+            </a:r>
+            <a:r>
+              <a:rPr lang="de-CH" dirty="0">
+                <a:latin typeface="Consolas" panose="020B0609020204030204" pitchFamily="49" charset="0"/>
+              </a:rPr>
+              <a:t> </a:t>
+            </a:r>
+            <a:r>
+              <a:rPr lang="de-CH" dirty="0" err="1">
+                <a:latin typeface="Consolas" panose="020B0609020204030204" pitchFamily="49" charset="0"/>
+              </a:rPr>
+              <a:t>html</a:t>
+            </a:r>
+            <a:r>
+              <a:rPr lang="de-CH" dirty="0">
+                <a:latin typeface="Consolas" panose="020B0609020204030204" pitchFamily="49" charset="0"/>
+              </a:rPr>
+              <a:t> Collection</a:t>
+            </a:r>
+          </a:p>
+          <a:p>
+            <a:r>
+              <a:rPr lang="de-CH" dirty="0" err="1">
+                <a:latin typeface="Consolas" panose="020B0609020204030204" pitchFamily="49" charset="0"/>
+              </a:rPr>
+              <a:t>document.getElementById</a:t>
+            </a:r>
+            <a:r>
+              <a:rPr lang="de-CH" dirty="0">
+                <a:latin typeface="Consolas" panose="020B0609020204030204" pitchFamily="49" charset="0"/>
+              </a:rPr>
+              <a:t>(‘</a:t>
+            </a:r>
+            <a:r>
+              <a:rPr lang="de-CH" dirty="0" err="1">
+                <a:latin typeface="Consolas" panose="020B0609020204030204" pitchFamily="49" charset="0"/>
+              </a:rPr>
+              <a:t>id</a:t>
+            </a:r>
+            <a:r>
+              <a:rPr lang="de-CH" dirty="0">
+                <a:latin typeface="Consolas" panose="020B0609020204030204" pitchFamily="49" charset="0"/>
+              </a:rPr>
+              <a:t>’); //</a:t>
+            </a:r>
+            <a:r>
+              <a:rPr lang="de-CH" dirty="0" err="1">
+                <a:latin typeface="Consolas" panose="020B0609020204030204" pitchFamily="49" charset="0"/>
+              </a:rPr>
+              <a:t>returns</a:t>
+            </a:r>
+            <a:r>
+              <a:rPr lang="de-CH" dirty="0">
+                <a:latin typeface="Consolas" panose="020B0609020204030204" pitchFamily="49" charset="0"/>
+              </a:rPr>
+              <a:t> </a:t>
+            </a:r>
+            <a:r>
+              <a:rPr lang="de-CH" dirty="0" err="1">
+                <a:latin typeface="Consolas" panose="020B0609020204030204" pitchFamily="49" charset="0"/>
+              </a:rPr>
+              <a:t>html</a:t>
+            </a:r>
+            <a:r>
+              <a:rPr lang="de-CH" dirty="0">
+                <a:latin typeface="Consolas" panose="020B0609020204030204" pitchFamily="49" charset="0"/>
+              </a:rPr>
+              <a:t> </a:t>
+            </a:r>
+            <a:r>
+              <a:rPr lang="de-CH" dirty="0" err="1">
+                <a:latin typeface="Consolas" panose="020B0609020204030204" pitchFamily="49" charset="0"/>
+              </a:rPr>
+              <a:t>element</a:t>
+            </a:r>
+            <a:endParaRPr lang="de-CH" dirty="0">
+              <a:latin typeface="Consolas" panose="020B0609020204030204" pitchFamily="49" charset="0"/>
+            </a:endParaRPr>
           </a:p>
         </p:txBody>
       </p:sp>
     </p:spTree>
     <p:extLst>
       <p:ext uri="{BB962C8B-B14F-4D97-AF65-F5344CB8AC3E}">
-        <p14:creationId xmlns:p14="http://schemas.microsoft.com/office/powerpoint/2010/main" val="702184386"/>
+        <p14:creationId xmlns:p14="http://schemas.microsoft.com/office/powerpoint/2010/main" val="680424845"/>
       </p:ext>
     </p:extLst>
   </p:cSld>
@@ -4782,20 +5115,8 @@
           <a:lstStyle/>
           <a:p>
             <a:r>
-              <a:rPr lang="de-CH" dirty="0" err="1"/>
-              <a:t>Get</a:t>
-            </a:r>
-            <a:r>
-              <a:rPr lang="de-CH" dirty="0"/>
-              <a:t> Elements </a:t>
-            </a:r>
-            <a:r>
-              <a:rPr lang="de-CH" dirty="0" err="1"/>
-              <a:t>from</a:t>
-            </a:r>
-            <a:r>
-              <a:rPr lang="de-CH" dirty="0"/>
-              <a:t> </a:t>
+              <a:rPr lang="de-CH" dirty="0"/>
+              <a:t>Neues Element im </a:t>
             </a:r>
             <a:r>
               <a:rPr lang="de-CH" dirty="0" err="1"/>
@@ -4835,18 +5156,31 @@
               <a:rPr lang="de-CH" dirty="0" err="1">
                 <a:latin typeface="Consolas" panose="020B0609020204030204" pitchFamily="49" charset="0"/>
               </a:rPr>
-              <a:t>document</a:t>
-            </a:r>
-            <a:endParaRPr lang="de-CH" dirty="0">
-              <a:latin typeface="Consolas" panose="020B0609020204030204" pitchFamily="49" charset="0"/>
-            </a:endParaRPr>
-          </a:p>
-          <a:p>
+              <a:t>var</a:t>
+            </a:r>
+            <a:r>
+              <a:rPr lang="de-CH" dirty="0">
+                <a:latin typeface="Consolas" panose="020B0609020204030204" pitchFamily="49" charset="0"/>
+              </a:rPr>
+              <a:t> </a:t>
+            </a:r>
             <a:r>
               <a:rPr lang="de-CH" dirty="0" err="1">
                 <a:latin typeface="Consolas" panose="020B0609020204030204" pitchFamily="49" charset="0"/>
               </a:rPr>
-              <a:t>document.getElementsByTagName</a:t>
+              <a:t>elem</a:t>
+            </a:r>
+            <a:r>
+              <a:rPr lang="de-CH" dirty="0">
+                <a:latin typeface="Consolas" panose="020B0609020204030204" pitchFamily="49" charset="0"/>
+              </a:rPr>
+              <a:t> = </a:t>
+            </a:r>
+            <a:r>
+              <a:rPr lang="de-CH" dirty="0" err="1">
+                <a:latin typeface="Consolas" panose="020B0609020204030204" pitchFamily="49" charset="0"/>
+              </a:rPr>
+              <a:t>document.createElement</a:t>
             </a:r>
             <a:r>
               <a:rPr lang="de-CH" dirty="0">
@@ -4858,154 +5192,47 @@
               <a:rPr lang="de-CH" dirty="0" err="1">
                 <a:latin typeface="Consolas" panose="020B0609020204030204" pitchFamily="49" charset="0"/>
               </a:rPr>
-              <a:t>Tagname</a:t>
-            </a:r>
-            <a:r>
-              <a:rPr lang="de-CH" dirty="0">
-                <a:latin typeface="Consolas" panose="020B0609020204030204" pitchFamily="49" charset="0"/>
-              </a:rPr>
-              <a:t>’); //</a:t>
-            </a:r>
+              <a:t>tagname</a:t>
+            </a:r>
+            <a:r>
+              <a:rPr lang="de-CH" dirty="0">
+                <a:latin typeface="Consolas" panose="020B0609020204030204" pitchFamily="49" charset="0"/>
+              </a:rPr>
+              <a:t>’);</a:t>
+            </a:r>
+          </a:p>
+          <a:p>
             <a:r>
               <a:rPr lang="de-CH" dirty="0" err="1">
                 <a:latin typeface="Consolas" panose="020B0609020204030204" pitchFamily="49" charset="0"/>
               </a:rPr>
-              <a:t>returns</a:t>
-            </a:r>
-            <a:r>
-              <a:rPr lang="de-CH" dirty="0">
-                <a:latin typeface="Consolas" panose="020B0609020204030204" pitchFamily="49" charset="0"/>
-              </a:rPr>
-              <a:t> </a:t>
+              <a:t>body.appendChild</a:t>
+            </a:r>
+            <a:r>
+              <a:rPr lang="de-CH" dirty="0">
+                <a:latin typeface="Consolas" panose="020B0609020204030204" pitchFamily="49" charset="0"/>
+              </a:rPr>
+              <a:t>(</a:t>
             </a:r>
             <a:r>
               <a:rPr lang="de-CH" dirty="0" err="1">
                 <a:latin typeface="Consolas" panose="020B0609020204030204" pitchFamily="49" charset="0"/>
               </a:rPr>
-              <a:t>html</a:t>
-            </a:r>
-            <a:r>
-              <a:rPr lang="de-CH" dirty="0">
-                <a:latin typeface="Consolas" panose="020B0609020204030204" pitchFamily="49" charset="0"/>
-              </a:rPr>
-              <a:t> Collection</a:t>
-            </a:r>
-          </a:p>
-          <a:p>
-            <a:r>
-              <a:rPr lang="de-CH" dirty="0" err="1">
-                <a:latin typeface="Consolas" panose="020B0609020204030204" pitchFamily="49" charset="0"/>
-              </a:rPr>
-              <a:t>document.getElementsByClassName</a:t>
-            </a:r>
-            <a:r>
-              <a:rPr lang="de-CH" dirty="0">
-                <a:latin typeface="Consolas" panose="020B0609020204030204" pitchFamily="49" charset="0"/>
-              </a:rPr>
-              <a:t>(‘</a:t>
-            </a:r>
-            <a:r>
-              <a:rPr lang="de-CH" dirty="0" err="1">
-                <a:latin typeface="Consolas" panose="020B0609020204030204" pitchFamily="49" charset="0"/>
-              </a:rPr>
-              <a:t>ClassName</a:t>
-            </a:r>
-            <a:r>
-              <a:rPr lang="de-CH" dirty="0">
-                <a:latin typeface="Consolas" panose="020B0609020204030204" pitchFamily="49" charset="0"/>
-              </a:rPr>
-              <a:t>’); //</a:t>
-            </a:r>
-            <a:r>
-              <a:rPr lang="de-CH" dirty="0" err="1">
-                <a:latin typeface="Consolas" panose="020B0609020204030204" pitchFamily="49" charset="0"/>
-              </a:rPr>
-              <a:t>returns</a:t>
-            </a:r>
-            <a:r>
-              <a:rPr lang="de-CH" dirty="0">
-                <a:latin typeface="Consolas" panose="020B0609020204030204" pitchFamily="49" charset="0"/>
-              </a:rPr>
-              <a:t> </a:t>
-            </a:r>
-            <a:r>
-              <a:rPr lang="de-CH" dirty="0" err="1">
-                <a:latin typeface="Consolas" panose="020B0609020204030204" pitchFamily="49" charset="0"/>
-              </a:rPr>
-              <a:t>html</a:t>
-            </a:r>
-            <a:r>
-              <a:rPr lang="de-CH" dirty="0">
-                <a:latin typeface="Consolas" panose="020B0609020204030204" pitchFamily="49" charset="0"/>
-              </a:rPr>
-              <a:t> Collection</a:t>
-            </a:r>
-          </a:p>
-          <a:p>
-            <a:r>
-              <a:rPr lang="de-CH" dirty="0" err="1">
-                <a:latin typeface="Consolas" panose="020B0609020204030204" pitchFamily="49" charset="0"/>
-              </a:rPr>
-              <a:t>document.getElementById</a:t>
-            </a:r>
-            <a:r>
-              <a:rPr lang="de-CH" dirty="0">
-                <a:latin typeface="Consolas" panose="020B0609020204030204" pitchFamily="49" charset="0"/>
-              </a:rPr>
-              <a:t>(‘</a:t>
-            </a:r>
-            <a:r>
-              <a:rPr lang="de-CH" dirty="0" err="1">
-                <a:latin typeface="Consolas" panose="020B0609020204030204" pitchFamily="49" charset="0"/>
-              </a:rPr>
-              <a:t>id</a:t>
-            </a:r>
-            <a:r>
-              <a:rPr lang="de-CH" dirty="0">
-                <a:latin typeface="Consolas" panose="020B0609020204030204" pitchFamily="49" charset="0"/>
-              </a:rPr>
-              <a:t>’); //</a:t>
-            </a:r>
-            <a:r>
-              <a:rPr lang="de-CH" dirty="0" err="1">
-                <a:latin typeface="Consolas" panose="020B0609020204030204" pitchFamily="49" charset="0"/>
-              </a:rPr>
-              <a:t>returns</a:t>
-            </a:r>
-            <a:r>
-              <a:rPr lang="de-CH" dirty="0">
-                <a:latin typeface="Consolas" panose="020B0609020204030204" pitchFamily="49" charset="0"/>
-              </a:rPr>
-              <a:t> </a:t>
-            </a:r>
-            <a:r>
-              <a:rPr lang="de-CH" dirty="0" err="1">
-                <a:latin typeface="Consolas" panose="020B0609020204030204" pitchFamily="49" charset="0"/>
-              </a:rPr>
-              <a:t>html</a:t>
-            </a:r>
-            <a:r>
-              <a:rPr lang="de-CH" dirty="0">
-                <a:latin typeface="Consolas" panose="020B0609020204030204" pitchFamily="49" charset="0"/>
-              </a:rPr>
-              <a:t> </a:t>
-            </a:r>
-            <a:r>
-              <a:rPr lang="de-CH" dirty="0" err="1">
-                <a:latin typeface="Consolas" panose="020B0609020204030204" pitchFamily="49" charset="0"/>
-              </a:rPr>
-              <a:t>element</a:t>
-            </a:r>
-            <a:endParaRPr lang="de-CH" dirty="0">
-              <a:latin typeface="Consolas" panose="020B0609020204030204" pitchFamily="49" charset="0"/>
-            </a:endParaRPr>
+              <a:t>elem</a:t>
+            </a:r>
+            <a:r>
+              <a:rPr lang="de-CH" dirty="0">
+                <a:latin typeface="Consolas" panose="020B0609020204030204" pitchFamily="49" charset="0"/>
+              </a:rPr>
+              <a:t>);</a:t>
+            </a:r>
           </a:p>
         </p:txBody>
       </p:sp>
     </p:spTree>
     <p:extLst>
       <p:ext uri="{BB962C8B-B14F-4D97-AF65-F5344CB8AC3E}">
-        <p14:creationId xmlns:p14="http://schemas.microsoft.com/office/powerpoint/2010/main" val="680424845"/>
+        <p14:creationId xmlns:p14="http://schemas.microsoft.com/office/powerpoint/2010/main" val="459377849"/>
       </p:ext>
     </p:extLst>
   </p:cSld>
@@ -5049,23 +5276,7 @@
           <a:p>
             <a:r>
               <a:rPr lang="de-CH" dirty="0"/>
-              <a:t>Create Elements in </a:t>
-            </a:r>
-            <a:r>
-              <a:rPr lang="de-CH" dirty="0" err="1"/>
-              <a:t>Document</a:t>
-            </a:r>
-            <a:r>
-              <a:rPr lang="de-CH" dirty="0"/>
-              <a:t> </a:t>
-            </a:r>
-            <a:r>
-              <a:rPr lang="de-CH" dirty="0" err="1"/>
-              <a:t>Object</a:t>
-            </a:r>
-            <a:r>
-              <a:rPr lang="de-CH" dirty="0"/>
-              <a:t> Model</a:t>
+              <a:t>Manipulation von HTML-Elementen</a:t>
             </a:r>
           </a:p>
         </p:txBody>
@@ -5089,71 +5300,114 @@
               <a:rPr lang="de-CH" dirty="0" err="1">
                 <a:latin typeface="Consolas" panose="020B0609020204030204" pitchFamily="49" charset="0"/>
               </a:rPr>
-              <a:t>var</a:t>
-            </a:r>
-            <a:r>
-              <a:rPr lang="de-CH" dirty="0">
-                <a:latin typeface="Consolas" panose="020B0609020204030204" pitchFamily="49" charset="0"/>
-              </a:rPr>
-              <a:t> </a:t>
-            </a:r>
+              <a:t>element.innerText</a:t>
+            </a:r>
+            <a:r>
+              <a:rPr lang="de-CH" dirty="0">
+                <a:latin typeface="Consolas" panose="020B0609020204030204" pitchFamily="49" charset="0"/>
+              </a:rPr>
+              <a:t> = “Hello”;</a:t>
+            </a:r>
+          </a:p>
+          <a:p>
             <a:r>
               <a:rPr lang="de-CH" dirty="0" err="1">
                 <a:latin typeface="Consolas" panose="020B0609020204030204" pitchFamily="49" charset="0"/>
               </a:rPr>
-              <a:t>element</a:t>
-            </a:r>
-            <a:r>
-              <a:rPr lang="de-CH" dirty="0">
-                <a:latin typeface="Consolas" panose="020B0609020204030204" pitchFamily="49" charset="0"/>
-              </a:rPr>
-              <a:t> = </a:t>
+              <a:t>element.innerHTML</a:t>
+            </a:r>
+            <a:r>
+              <a:rPr lang="de-CH" dirty="0">
+                <a:latin typeface="Consolas" panose="020B0609020204030204" pitchFamily="49" charset="0"/>
+              </a:rPr>
+              <a:t> = ”&lt;a </a:t>
             </a:r>
             <a:r>
               <a:rPr lang="de-CH" dirty="0" err="1">
                 <a:latin typeface="Consolas" panose="020B0609020204030204" pitchFamily="49" charset="0"/>
               </a:rPr>
-              <a:t>document.createElement</a:t>
-            </a:r>
-            <a:r>
-              <a:rPr lang="de-CH" dirty="0">
-                <a:latin typeface="Consolas" panose="020B0609020204030204" pitchFamily="49" charset="0"/>
-              </a:rPr>
-              <a:t>(’</a:t>
-            </a:r>
+              <a:t>href</a:t>
+            </a:r>
+            <a:r>
+              <a:rPr lang="de-CH" dirty="0">
+                <a:latin typeface="Consolas" panose="020B0609020204030204" pitchFamily="49" charset="0"/>
+              </a:rPr>
+              <a:t>=’google.com’&gt;Link&lt;/a&gt;”;</a:t>
+            </a:r>
+          </a:p>
+          <a:p>
             <a:r>
               <a:rPr lang="de-CH" dirty="0" err="1">
                 <a:latin typeface="Consolas" panose="020B0609020204030204" pitchFamily="49" charset="0"/>
               </a:rPr>
-              <a:t>tagname</a:t>
-            </a:r>
-            <a:r>
-              <a:rPr lang="de-CH" dirty="0">
-                <a:latin typeface="Consolas" panose="020B0609020204030204" pitchFamily="49" charset="0"/>
-              </a:rPr>
-              <a:t>’);</a:t>
-            </a:r>
-          </a:p>
-          <a:p>
+              <a:t>element.style.backgroundColor</a:t>
+            </a:r>
+            <a:r>
+              <a:rPr lang="de-CH" dirty="0">
+                <a:latin typeface="Consolas" panose="020B0609020204030204" pitchFamily="49" charset="0"/>
+              </a:rPr>
+              <a:t> = “</a:t>
+            </a:r>
             <a:r>
               <a:rPr lang="de-CH" dirty="0" err="1">
                 <a:latin typeface="Consolas" panose="020B0609020204030204" pitchFamily="49" charset="0"/>
               </a:rPr>
-              <a:t>body.appendChild</a:t>
-            </a:r>
-            <a:r>
-              <a:rPr lang="de-CH" dirty="0">
-                <a:latin typeface="Consolas" panose="020B0609020204030204" pitchFamily="49" charset="0"/>
-              </a:rPr>
-              <a:t>(a);</a:t>
-            </a:r>
+              <a:t>blue</a:t>
+            </a:r>
+            <a:r>
+              <a:rPr lang="de-CH" dirty="0">
+                <a:latin typeface="Consolas" panose="020B0609020204030204" pitchFamily="49" charset="0"/>
+              </a:rPr>
+              <a:t>”;</a:t>
+            </a:r>
+          </a:p>
+          <a:p>
+            <a:r>
+              <a:rPr lang="de-CH" dirty="0" err="1">
+                <a:latin typeface="Consolas" panose="020B0609020204030204" pitchFamily="49" charset="0"/>
+              </a:rPr>
+              <a:t>element.ClassList.add</a:t>
+            </a:r>
+            <a:r>
+              <a:rPr lang="de-CH" dirty="0">
+                <a:latin typeface="Consolas" panose="020B0609020204030204" pitchFamily="49" charset="0"/>
+              </a:rPr>
+              <a:t>(‘Class1’,’Class2’);</a:t>
+            </a:r>
+          </a:p>
+          <a:p>
+            <a:r>
+              <a:rPr lang="de-CH" dirty="0">
+                <a:latin typeface="Consolas" panose="020B0609020204030204" pitchFamily="49" charset="0"/>
+              </a:rPr>
+              <a:t>element.id = ”</a:t>
+            </a:r>
+            <a:r>
+              <a:rPr lang="de-CH" dirty="0" err="1">
+                <a:latin typeface="Consolas" panose="020B0609020204030204" pitchFamily="49" charset="0"/>
+              </a:rPr>
+              <a:t>unique</a:t>
+            </a:r>
+            <a:r>
+              <a:rPr lang="de-CH" dirty="0">
+                <a:latin typeface="Consolas" panose="020B0609020204030204" pitchFamily="49" charset="0"/>
+              </a:rPr>
+              <a:t>”;</a:t>
+            </a:r>
+          </a:p>
+          <a:p>
+            <a:r>
+              <a:rPr lang="de-CH" dirty="0"/>
+              <a:t>Und viele mehr…</a:t>
+            </a:r>
+            <a:endParaRPr lang="en-GB" dirty="0"/>
           </a:p>
         </p:txBody>
       </p:sp>
     </p:spTree>
     <p:extLst>
       <p:ext uri="{BB962C8B-B14F-4D97-AF65-F5344CB8AC3E}">
-        <p14:creationId xmlns:p14="http://schemas.microsoft.com/office/powerpoint/2010/main" val="459377849"/>
+        <p14:creationId xmlns:p14="http://schemas.microsoft.com/office/powerpoint/2010/main" val="1534285705"/>
       </p:ext>
     </p:extLst>
   </p:cSld>
@@ -5197,7 +5451,7 @@
           <a:p>
             <a:r>
               <a:rPr lang="de-CH" dirty="0"/>
-              <a:t>Manipulation von HTML-Elementen</a:t>
+              <a:t>Operators</a:t>
             </a:r>
           </a:p>
         </p:txBody>
@@ -5218,117 +5472,22 @@
           <a:lstStyle/>
           <a:p>
             <a:r>
-              <a:rPr lang="de-CH" dirty="0" err="1">
-                <a:latin typeface="Consolas" panose="020B0609020204030204" pitchFamily="49" charset="0"/>
-              </a:rPr>
-              <a:t>element.innerText</a:t>
-            </a:r>
-            <a:r>
-              <a:rPr lang="de-CH" dirty="0">
-                <a:latin typeface="Consolas" panose="020B0609020204030204" pitchFamily="49" charset="0"/>
-              </a:rPr>
-              <a:t> = “Hello”;</a:t>
-            </a:r>
-          </a:p>
-          <a:p>
-            <a:r>
-              <a:rPr lang="de-CH" dirty="0" err="1">
-                <a:latin typeface="Consolas" panose="020B0609020204030204" pitchFamily="49" charset="0"/>
-              </a:rPr>
-              <a:t>element.innerHTML</a:t>
-            </a:r>
-            <a:r>
-              <a:rPr lang="de-CH" dirty="0">
-                <a:latin typeface="Consolas" panose="020B0609020204030204" pitchFamily="49" charset="0"/>
-              </a:rPr>
-              <a:t> = ”&lt;a </a:t>
-            </a:r>
-            <a:r>
-              <a:rPr lang="de-CH" dirty="0" err="1">
-                <a:latin typeface="Consolas" panose="020B0609020204030204" pitchFamily="49" charset="0"/>
-              </a:rPr>
-              <a:t>href</a:t>
-            </a:r>
-            <a:r>
-              <a:rPr lang="de-CH" dirty="0">
-                <a:latin typeface="Consolas" panose="020B0609020204030204" pitchFamily="49" charset="0"/>
-              </a:rPr>
-              <a:t>=’google.com’&gt;Link&lt;/a&gt;”;</a:t>
-            </a:r>
-          </a:p>
-          <a:p>
-            <a:r>
-              <a:rPr lang="de-CH" dirty="0" err="1">
-                <a:latin typeface="Consolas" panose="020B0609020204030204" pitchFamily="49" charset="0"/>
-              </a:rPr>
-              <a:t>element.style.backgroundColor</a:t>
-            </a:r>
-            <a:r>
-              <a:rPr lang="de-CH" dirty="0">
-                <a:latin typeface="Consolas" panose="020B0609020204030204" pitchFamily="49" charset="0"/>
-              </a:rPr>
-              <a:t> = “</a:t>
-            </a:r>
-            <a:r>
-              <a:rPr lang="de-CH" dirty="0" err="1">
-                <a:latin typeface="Consolas" panose="020B0609020204030204" pitchFamily="49" charset="0"/>
-              </a:rPr>
-              <a:t>blue</a:t>
-            </a:r>
-            <a:r>
-              <a:rPr lang="de-CH" dirty="0">
-                <a:latin typeface="Consolas" panose="020B0609020204030204" pitchFamily="49" charset="0"/>
-              </a:rPr>
-              <a:t>”;</a:t>
-            </a:r>
-          </a:p>
-          <a:p>
-            <a:r>
-              <a:rPr lang="de-CH" dirty="0" err="1">
-                <a:latin typeface="Consolas" panose="020B0609020204030204" pitchFamily="49" charset="0"/>
-              </a:rPr>
-              <a:t>element.ClassList.add</a:t>
-            </a:r>
-            <a:r>
-              <a:rPr lang="de-CH" dirty="0">
-                <a:latin typeface="Consolas" panose="020B0609020204030204" pitchFamily="49" charset="0"/>
-              </a:rPr>
-              <a:t>(‘Class1’,’Class2’);</a:t>
-            </a:r>
-          </a:p>
-          <a:p>
-            <a:r>
-              <a:rPr lang="de-CH" dirty="0">
-                <a:latin typeface="Consolas" panose="020B0609020204030204" pitchFamily="49" charset="0"/>
-              </a:rPr>
-              <a:t>element.id = ”</a:t>
-            </a:r>
-            <a:r>
-              <a:rPr lang="de-CH" dirty="0" err="1">
-                <a:latin typeface="Consolas" panose="020B0609020204030204" pitchFamily="49" charset="0"/>
-              </a:rPr>
-              <a:t>unique</a:t>
-            </a:r>
-            <a:r>
-              <a:rPr lang="de-CH" dirty="0">
-                <a:latin typeface="Consolas" panose="020B0609020204030204" pitchFamily="49" charset="0"/>
-              </a:rPr>
-              <a:t>”;</a:t>
-            </a:r>
-          </a:p>
-          <a:p>
-            <a:r>
-              <a:rPr lang="de-CH" dirty="0"/>
-              <a:t>Und viele mehr…</a:t>
-            </a:r>
-            <a:endParaRPr lang="en-GB" dirty="0"/>
+              <a:rPr lang="en-GB" dirty="0">
+                <a:hlinkClick r:id="rId2"/>
+              </a:rPr>
+              <a:t>http://www.w3schools.com/js/js_operators.asp</a:t>
+            </a:r>
+            <a:r>
+              <a:rPr lang="en-GB" dirty="0"/>
+              <a:t> </a:t>
+            </a:r>
           </a:p>
         </p:txBody>
       </p:sp>
     </p:spTree>
     <p:extLst>
       <p:ext uri="{BB962C8B-B14F-4D97-AF65-F5344CB8AC3E}">
-        <p14:creationId xmlns:p14="http://schemas.microsoft.com/office/powerpoint/2010/main" val="1534285705"/>
+        <p14:creationId xmlns:p14="http://schemas.microsoft.com/office/powerpoint/2010/main" val="2047387429"/>
       </p:ext>
     </p:extLst>
   </p:cSld>
@@ -5371,9 +5530,10 @@
           <a:lstStyle/>
           <a:p>
             <a:r>
-              <a:rPr lang="de-CH" dirty="0"/>
-              <a:t>Operators</a:t>
-            </a:r>
+              <a:rPr lang="de-CH" dirty="0" err="1"/>
+              <a:t>Object</a:t>
+            </a:r>
+            <a:endParaRPr lang="de-CH" dirty="0"/>
           </a:p>
         </p:txBody>
       </p:sp>
@@ -5393,14 +5553,76 @@
           <a:lstStyle/>
           <a:p>
             <a:r>
-              <a:rPr lang="en-GB" dirty="0">
-                <a:hlinkClick r:id="rId2"/>
-              </a:rPr>
-              <a:t>http://www.w3schools.com/js/js_operators.asp</a:t>
-            </a:r>
-            <a:r>
-              <a:rPr lang="en-GB" dirty="0"/>
+              <a:rPr lang="de-CH" dirty="0" err="1">
+                <a:latin typeface="Consolas" panose="020B0609020204030204" pitchFamily="49" charset="0"/>
+              </a:rPr>
+              <a:t>var</a:t>
+            </a:r>
+            <a:r>
+              <a:rPr lang="de-CH" dirty="0">
+                <a:latin typeface="Consolas" panose="020B0609020204030204" pitchFamily="49" charset="0"/>
+              </a:rPr>
               <a:t> </a:t>
+            </a:r>
+            <a:r>
+              <a:rPr lang="de-CH" dirty="0" err="1">
+                <a:latin typeface="Consolas" panose="020B0609020204030204" pitchFamily="49" charset="0"/>
+              </a:rPr>
+              <a:t>person</a:t>
+            </a:r>
+            <a:r>
+              <a:rPr lang="de-CH" dirty="0">
+                <a:latin typeface="Consolas" panose="020B0609020204030204" pitchFamily="49" charset="0"/>
+              </a:rPr>
+              <a:t> = {</a:t>
+            </a:r>
+            <a:r>
+              <a:rPr lang="de-CH" dirty="0" err="1">
+                <a:latin typeface="Consolas" panose="020B0609020204030204" pitchFamily="49" charset="0"/>
+              </a:rPr>
+              <a:t>name</a:t>
+            </a:r>
+            <a:r>
+              <a:rPr lang="de-CH" dirty="0">
+                <a:latin typeface="Consolas" panose="020B0609020204030204" pitchFamily="49" charset="0"/>
+              </a:rPr>
+              <a:t>: “</a:t>
+            </a:r>
+            <a:r>
+              <a:rPr lang="de-CH" dirty="0" err="1">
+                <a:latin typeface="Consolas" panose="020B0609020204030204" pitchFamily="49" charset="0"/>
+              </a:rPr>
+              <a:t>name</a:t>
+            </a:r>
+            <a:r>
+              <a:rPr lang="de-CH" dirty="0">
+                <a:latin typeface="Consolas" panose="020B0609020204030204" pitchFamily="49" charset="0"/>
+              </a:rPr>
+              <a:t>”, </a:t>
+            </a:r>
+            <a:r>
+              <a:rPr lang="de-CH" dirty="0" err="1">
+                <a:latin typeface="Consolas" panose="020B0609020204030204" pitchFamily="49" charset="0"/>
+              </a:rPr>
+              <a:t>lastname</a:t>
+            </a:r>
+            <a:r>
+              <a:rPr lang="de-CH" dirty="0">
+                <a:latin typeface="Consolas" panose="020B0609020204030204" pitchFamily="49" charset="0"/>
+              </a:rPr>
+              <a:t>: “</a:t>
+            </a:r>
+            <a:r>
+              <a:rPr lang="de-CH" dirty="0" err="1">
+                <a:latin typeface="Consolas" panose="020B0609020204030204" pitchFamily="49" charset="0"/>
+              </a:rPr>
+              <a:t>lastname</a:t>
+            </a:r>
+            <a:r>
+              <a:rPr lang="de-CH" dirty="0">
+                <a:latin typeface="Consolas" panose="020B0609020204030204" pitchFamily="49" charset="0"/>
+              </a:rPr>
+              <a:t>”};</a:t>
             </a:r>
           </a:p>
         </p:txBody>
@@ -5408,7 +5630,7 @@
     </p:spTree>
     <p:extLst>
       <p:ext uri="{BB962C8B-B14F-4D97-AF65-F5344CB8AC3E}">
-        <p14:creationId xmlns:p14="http://schemas.microsoft.com/office/powerpoint/2010/main" val="2047387429"/>
+        <p14:creationId xmlns:p14="http://schemas.microsoft.com/office/powerpoint/2010/main" val="518010740"/>
       </p:ext>
     </p:extLst>
   </p:cSld>
@@ -5451,107 +5673,233 @@
           <a:lstStyle/>
           <a:p>
             <a:r>
-              <a:rPr lang="de-CH" dirty="0" err="1"/>
-              <a:t>Object</a:t>
-            </a:r>
+              <a:rPr lang="de-CH" dirty="0"/>
+              <a:t>Array</a:t>
+            </a:r>
+          </a:p>
+        </p:txBody>
+      </p:sp>
+      <p:sp>
+        <p:nvSpPr>
+          <p:cNvPr id="3" name="Content Placeholder 2"/>
+          <p:cNvSpPr>
+            <a:spLocks noGrp="1"/>
+          </p:cNvSpPr>
+          <p:nvPr>
+            <p:ph idx="1"/>
+          </p:nvPr>
+        </p:nvSpPr>
+        <p:spPr/>
+        <p:txBody>
+          <a:bodyPr/>
+          <a:lstStyle/>
+          <a:p>
+            <a:r>
+              <a:rPr lang="de-CH" dirty="0"/>
+              <a:t>Dynamic</a:t>
+            </a:r>
+          </a:p>
+          <a:p>
+            <a:r>
+              <a:rPr lang="de-CH" dirty="0" err="1">
+                <a:latin typeface="Consolas" panose="020B0609020204030204" pitchFamily="49" charset="0"/>
+              </a:rPr>
+              <a:t>var</a:t>
+            </a:r>
+            <a:r>
+              <a:rPr lang="de-CH" dirty="0">
+                <a:latin typeface="Consolas" panose="020B0609020204030204" pitchFamily="49" charset="0"/>
+              </a:rPr>
+              <a:t> </a:t>
+            </a:r>
+            <a:r>
+              <a:rPr lang="de-CH" dirty="0" err="1">
+                <a:latin typeface="Consolas" panose="020B0609020204030204" pitchFamily="49" charset="0"/>
+              </a:rPr>
+              <a:t>array</a:t>
+            </a:r>
+            <a:r>
+              <a:rPr lang="de-CH" dirty="0">
+                <a:latin typeface="Consolas" panose="020B0609020204030204" pitchFamily="49" charset="0"/>
+              </a:rPr>
+              <a:t> = [1,2,3,4,5];</a:t>
+            </a:r>
+          </a:p>
+          <a:p>
+            <a:r>
+              <a:rPr lang="de-CH" dirty="0" err="1">
+                <a:latin typeface="Consolas" panose="020B0609020204030204" pitchFamily="49" charset="0"/>
+              </a:rPr>
+              <a:t>var</a:t>
+            </a:r>
+            <a:r>
+              <a:rPr lang="de-CH" dirty="0">
+                <a:latin typeface="Consolas" panose="020B0609020204030204" pitchFamily="49" charset="0"/>
+              </a:rPr>
+              <a:t> </a:t>
+            </a:r>
+            <a:r>
+              <a:rPr lang="de-CH" dirty="0" err="1">
+                <a:latin typeface="Consolas" panose="020B0609020204030204" pitchFamily="49" charset="0"/>
+              </a:rPr>
+              <a:t>array</a:t>
+            </a:r>
+            <a:r>
+              <a:rPr lang="de-CH" dirty="0">
+                <a:latin typeface="Consolas" panose="020B0609020204030204" pitchFamily="49" charset="0"/>
+              </a:rPr>
+              <a:t> = </a:t>
+            </a:r>
+            <a:r>
+              <a:rPr lang="de-CH" dirty="0" err="1">
+                <a:latin typeface="Consolas" panose="020B0609020204030204" pitchFamily="49" charset="0"/>
+              </a:rPr>
+              <a:t>new</a:t>
+            </a:r>
+            <a:r>
+              <a:rPr lang="de-CH" dirty="0">
+                <a:latin typeface="Consolas" panose="020B0609020204030204" pitchFamily="49" charset="0"/>
+              </a:rPr>
+              <a:t> Array();</a:t>
+            </a:r>
+          </a:p>
+          <a:p>
+            <a:r>
+              <a:rPr lang="de-CH" dirty="0" err="1">
+                <a:latin typeface="Consolas" panose="020B0609020204030204" pitchFamily="49" charset="0"/>
+              </a:rPr>
+              <a:t>var</a:t>
+            </a:r>
+            <a:r>
+              <a:rPr lang="de-CH" dirty="0">
+                <a:latin typeface="Consolas" panose="020B0609020204030204" pitchFamily="49" charset="0"/>
+              </a:rPr>
+              <a:t> </a:t>
+            </a:r>
+            <a:r>
+              <a:rPr lang="de-CH" dirty="0" err="1">
+                <a:latin typeface="Consolas" panose="020B0609020204030204" pitchFamily="49" charset="0"/>
+              </a:rPr>
+              <a:t>array</a:t>
+            </a:r>
+            <a:r>
+              <a:rPr lang="de-CH" dirty="0">
+                <a:latin typeface="Consolas" panose="020B0609020204030204" pitchFamily="49" charset="0"/>
+              </a:rPr>
+              <a:t> = [];</a:t>
+            </a:r>
+          </a:p>
+          <a:p>
+            <a:r>
+              <a:rPr lang="de-CH" dirty="0" err="1">
+                <a:latin typeface="Consolas" panose="020B0609020204030204" pitchFamily="49" charset="0"/>
+              </a:rPr>
+              <a:t>array</a:t>
+            </a:r>
+            <a:r>
+              <a:rPr lang="de-CH" dirty="0">
+                <a:latin typeface="Consolas" panose="020B0609020204030204" pitchFamily="49" charset="0"/>
+              </a:rPr>
+              <a:t>[0];</a:t>
+            </a:r>
+          </a:p>
+          <a:p>
+            <a:r>
+              <a:rPr lang="de-CH" dirty="0" err="1">
+                <a:latin typeface="Consolas" panose="020B0609020204030204" pitchFamily="49" charset="0"/>
+              </a:rPr>
+              <a:t>array.push</a:t>
+            </a:r>
+            <a:r>
+              <a:rPr lang="de-CH" dirty="0">
+                <a:latin typeface="Consolas" panose="020B0609020204030204" pitchFamily="49" charset="0"/>
+              </a:rPr>
+              <a:t>(5);</a:t>
+            </a:r>
+          </a:p>
+          <a:p>
+            <a:r>
+              <a:rPr lang="de-CH" dirty="0" err="1">
+                <a:latin typeface="Consolas" panose="020B0609020204030204" pitchFamily="49" charset="0"/>
+              </a:rPr>
+              <a:t>var</a:t>
+            </a:r>
+            <a:r>
+              <a:rPr lang="de-CH" dirty="0">
+                <a:latin typeface="Consolas" panose="020B0609020204030204" pitchFamily="49" charset="0"/>
+              </a:rPr>
+              <a:t> </a:t>
+            </a:r>
+            <a:r>
+              <a:rPr lang="de-CH" dirty="0" err="1">
+                <a:latin typeface="Consolas" panose="020B0609020204030204" pitchFamily="49" charset="0"/>
+              </a:rPr>
+              <a:t>objectArray</a:t>
+            </a:r>
+            <a:r>
+              <a:rPr lang="de-CH" dirty="0">
+                <a:latin typeface="Consolas" panose="020B0609020204030204" pitchFamily="49" charset="0"/>
+              </a:rPr>
+              <a:t> = [{</a:t>
+            </a:r>
+            <a:r>
+              <a:rPr lang="de-CH" dirty="0" err="1">
+                <a:latin typeface="Consolas" panose="020B0609020204030204" pitchFamily="49" charset="0"/>
+              </a:rPr>
+              <a:t>name</a:t>
+            </a:r>
+            <a:r>
+              <a:rPr lang="de-CH" dirty="0">
+                <a:latin typeface="Consolas" panose="020B0609020204030204" pitchFamily="49" charset="0"/>
+              </a:rPr>
+              <a:t>:"</a:t>
+            </a:r>
+            <a:r>
+              <a:rPr lang="de-CH" dirty="0" err="1">
+                <a:latin typeface="Consolas" panose="020B0609020204030204" pitchFamily="49" charset="0"/>
+              </a:rPr>
+              <a:t>name</a:t>
+            </a:r>
+            <a:r>
+              <a:rPr lang="de-CH" dirty="0">
+                <a:latin typeface="Consolas" panose="020B0609020204030204" pitchFamily="49" charset="0"/>
+              </a:rPr>
+              <a:t>",</a:t>
+            </a:r>
+            <a:r>
+              <a:rPr lang="de-CH" dirty="0" err="1">
+                <a:latin typeface="Consolas" panose="020B0609020204030204" pitchFamily="49" charset="0"/>
+              </a:rPr>
+              <a:t>lastname</a:t>
+            </a:r>
+            <a:r>
+              <a:rPr lang="de-CH" dirty="0">
+                <a:latin typeface="Consolas" panose="020B0609020204030204" pitchFamily="49" charset="0"/>
+              </a:rPr>
+              <a:t>:"</a:t>
+            </a:r>
+            <a:r>
+              <a:rPr lang="de-CH" dirty="0" err="1">
+                <a:latin typeface="Consolas" panose="020B0609020204030204" pitchFamily="49" charset="0"/>
+              </a:rPr>
+              <a:t>lastname</a:t>
+            </a:r>
+            <a:r>
+              <a:rPr lang="de-CH" dirty="0">
+                <a:latin typeface="Consolas" panose="020B0609020204030204" pitchFamily="49" charset="0"/>
+              </a:rPr>
+              <a:t>"},{name:"2name",lastname:"2lastname"}]</a:t>
+            </a:r>
+          </a:p>
+          <a:p>
             <a:endParaRPr lang="de-CH" dirty="0"/>
-          </a:p>
-        </p:txBody>
-      </p:sp>
-      <p:sp>
-        <p:nvSpPr>
-          <p:cNvPr id="3" name="Content Placeholder 2"/>
-          <p:cNvSpPr>
-            <a:spLocks noGrp="1"/>
-          </p:cNvSpPr>
-          <p:nvPr>
-            <p:ph idx="1"/>
-          </p:nvPr>
-        </p:nvSpPr>
-        <p:spPr/>
-        <p:txBody>
-          <a:bodyPr/>
-          <a:lstStyle/>
-          <a:p>
-            <a:r>
-              <a:rPr lang="de-CH" dirty="0" err="1">
-                <a:latin typeface="Consolas" panose="020B0609020204030204" pitchFamily="49" charset="0"/>
-              </a:rPr>
-              <a:t>var</a:t>
-            </a:r>
-            <a:r>
-              <a:rPr lang="de-CH" dirty="0">
-                <a:latin typeface="Consolas" panose="020B0609020204030204" pitchFamily="49" charset="0"/>
-              </a:rPr>
-              <a:t> </a:t>
-            </a:r>
-            <a:r>
-              <a:rPr lang="de-CH" dirty="0" err="1">
-                <a:latin typeface="Consolas" panose="020B0609020204030204" pitchFamily="49" charset="0"/>
-              </a:rPr>
-              <a:t>person</a:t>
-            </a:r>
-            <a:r>
-              <a:rPr lang="de-CH" dirty="0">
-                <a:latin typeface="Consolas" panose="020B0609020204030204" pitchFamily="49" charset="0"/>
-              </a:rPr>
-              <a:t> = {</a:t>
-            </a:r>
-            <a:r>
-              <a:rPr lang="de-CH" dirty="0" err="1">
-                <a:latin typeface="Consolas" panose="020B0609020204030204" pitchFamily="49" charset="0"/>
-              </a:rPr>
-              <a:t>name</a:t>
-            </a:r>
-            <a:r>
-              <a:rPr lang="de-CH" dirty="0">
-                <a:latin typeface="Consolas" panose="020B0609020204030204" pitchFamily="49" charset="0"/>
-              </a:rPr>
-              <a:t>: “</a:t>
-            </a:r>
-            <a:r>
-              <a:rPr lang="de-CH" dirty="0" err="1">
-                <a:latin typeface="Consolas" panose="020B0609020204030204" pitchFamily="49" charset="0"/>
-              </a:rPr>
-              <a:t>name</a:t>
-            </a:r>
-            <a:r>
-              <a:rPr lang="de-CH" dirty="0">
-                <a:latin typeface="Consolas" panose="020B0609020204030204" pitchFamily="49" charset="0"/>
-              </a:rPr>
-              <a:t>”, </a:t>
-            </a:r>
-            <a:r>
-              <a:rPr lang="de-CH" dirty="0" err="1">
-                <a:latin typeface="Consolas" panose="020B0609020204030204" pitchFamily="49" charset="0"/>
-              </a:rPr>
-              <a:t>lastname</a:t>
-            </a:r>
-            <a:r>
-              <a:rPr lang="de-CH" dirty="0">
-                <a:latin typeface="Consolas" panose="020B0609020204030204" pitchFamily="49" charset="0"/>
-              </a:rPr>
-              <a:t>: “</a:t>
-            </a:r>
-            <a:r>
-              <a:rPr lang="de-CH" dirty="0" err="1">
-                <a:latin typeface="Consolas" panose="020B0609020204030204" pitchFamily="49" charset="0"/>
-              </a:rPr>
-              <a:t>lastname</a:t>
-            </a:r>
-            <a:r>
-              <a:rPr lang="de-CH" dirty="0">
-                <a:latin typeface="Consolas" panose="020B0609020204030204" pitchFamily="49" charset="0"/>
-              </a:rPr>
-              <a:t>”};</a:t>
-            </a:r>
           </a:p>
         </p:txBody>
       </p:sp>
     </p:spTree>
     <p:extLst>
       <p:ext uri="{BB962C8B-B14F-4D97-AF65-F5344CB8AC3E}">
-        <p14:creationId xmlns:p14="http://schemas.microsoft.com/office/powerpoint/2010/main" val="518010740"/>
+        <p14:creationId xmlns:p14="http://schemas.microsoft.com/office/powerpoint/2010/main" val="365940414"/>
       </p:ext>
     </p:extLst>
   </p:cSld>
@@ -5594,8 +5942,8 @@
           <a:lstStyle/>
           <a:p>
             <a:r>
-              <a:rPr lang="de-CH" dirty="0"/>
-              <a:t>Array</a:t>
+              <a:rPr lang="en-US" dirty="0"/>
+              <a:t>Functions</a:t>
             </a:r>
           </a:p>
         </p:txBody>
@@ -5617,210 +5965,32 @@
           <a:p>
             <a:r>
               <a:rPr lang="de-CH" dirty="0"/>
-              <a:t>Dynamic</a:t>
-            </a:r>
-          </a:p>
-          <a:p>
-            <a:r>
-              <a:rPr lang="de-CH" dirty="0" err="1">
-                <a:latin typeface="Consolas" panose="020B0609020204030204" pitchFamily="49" charset="0"/>
-              </a:rPr>
-              <a:t>var</a:t>
-            </a:r>
-            <a:r>
-              <a:rPr lang="de-CH" dirty="0">
-                <a:latin typeface="Consolas" panose="020B0609020204030204" pitchFamily="49" charset="0"/>
-              </a:rPr>
-              <a:t> </a:t>
-            </a:r>
-            <a:r>
-              <a:rPr lang="de-CH" dirty="0" err="1">
-                <a:latin typeface="Consolas" panose="020B0609020204030204" pitchFamily="49" charset="0"/>
-              </a:rPr>
-              <a:t>array</a:t>
-            </a:r>
-            <a:r>
-              <a:rPr lang="de-CH" dirty="0">
-                <a:latin typeface="Consolas" panose="020B0609020204030204" pitchFamily="49" charset="0"/>
-              </a:rPr>
-              <a:t> = [1,2,3,4,5];</a:t>
-            </a:r>
-          </a:p>
-          <a:p>
-            <a:r>
-              <a:rPr lang="de-CH" dirty="0" err="1">
-                <a:latin typeface="Consolas" panose="020B0609020204030204" pitchFamily="49" charset="0"/>
-              </a:rPr>
-              <a:t>var</a:t>
-            </a:r>
-            <a:r>
-              <a:rPr lang="de-CH" dirty="0">
-                <a:latin typeface="Consolas" panose="020B0609020204030204" pitchFamily="49" charset="0"/>
-              </a:rPr>
-              <a:t> </a:t>
-            </a:r>
-            <a:r>
-              <a:rPr lang="de-CH" dirty="0" err="1">
-                <a:latin typeface="Consolas" panose="020B0609020204030204" pitchFamily="49" charset="0"/>
-              </a:rPr>
-              <a:t>array</a:t>
-            </a:r>
-            <a:r>
-              <a:rPr lang="de-CH" dirty="0">
-                <a:latin typeface="Consolas" panose="020B0609020204030204" pitchFamily="49" charset="0"/>
-              </a:rPr>
-              <a:t> = </a:t>
-            </a:r>
-            <a:r>
-              <a:rPr lang="de-CH" dirty="0" err="1">
-                <a:latin typeface="Consolas" panose="020B0609020204030204" pitchFamily="49" charset="0"/>
-              </a:rPr>
-              <a:t>new</a:t>
-            </a:r>
-            <a:r>
-              <a:rPr lang="de-CH" dirty="0">
-                <a:latin typeface="Consolas" panose="020B0609020204030204" pitchFamily="49" charset="0"/>
-              </a:rPr>
-              <a:t> Array();</a:t>
-            </a:r>
-          </a:p>
-          <a:p>
-            <a:r>
-              <a:rPr lang="de-CH" dirty="0" err="1">
-                <a:latin typeface="Consolas" panose="020B0609020204030204" pitchFamily="49" charset="0"/>
-              </a:rPr>
-              <a:t>var</a:t>
-            </a:r>
-            <a:r>
-              <a:rPr lang="de-CH" dirty="0">
-                <a:latin typeface="Consolas" panose="020B0609020204030204" pitchFamily="49" charset="0"/>
-              </a:rPr>
-              <a:t> </a:t>
-            </a:r>
-            <a:r>
-              <a:rPr lang="de-CH" dirty="0" err="1">
-                <a:latin typeface="Consolas" panose="020B0609020204030204" pitchFamily="49" charset="0"/>
-              </a:rPr>
-              <a:t>array</a:t>
-            </a:r>
-            <a:r>
-              <a:rPr lang="de-CH" dirty="0">
-                <a:latin typeface="Consolas" panose="020B0609020204030204" pitchFamily="49" charset="0"/>
-              </a:rPr>
-              <a:t> = [];</a:t>
-            </a:r>
-          </a:p>
-          <a:p>
-            <a:r>
-              <a:rPr lang="de-CH" dirty="0" err="1">
-                <a:latin typeface="Consolas" panose="020B0609020204030204" pitchFamily="49" charset="0"/>
-              </a:rPr>
-              <a:t>array</a:t>
-            </a:r>
-            <a:r>
-              <a:rPr lang="de-CH" dirty="0">
-                <a:latin typeface="Consolas" panose="020B0609020204030204" pitchFamily="49" charset="0"/>
-              </a:rPr>
-              <a:t>[0];</a:t>
-            </a:r>
-          </a:p>
-          <a:p>
-            <a:r>
-              <a:rPr lang="de-CH" dirty="0" err="1">
-                <a:latin typeface="Consolas" panose="020B0609020204030204" pitchFamily="49" charset="0"/>
-              </a:rPr>
-              <a:t>array.push</a:t>
-            </a:r>
-            <a:r>
-              <a:rPr lang="de-CH" dirty="0">
-                <a:latin typeface="Consolas" panose="020B0609020204030204" pitchFamily="49" charset="0"/>
-              </a:rPr>
-              <a:t>(5);</a:t>
-            </a:r>
-          </a:p>
-          <a:p>
-            <a:r>
-              <a:rPr lang="de-CH" dirty="0" err="1">
-                <a:latin typeface="Consolas" panose="020B0609020204030204" pitchFamily="49" charset="0"/>
-              </a:rPr>
-              <a:t>var</a:t>
-            </a:r>
-            <a:r>
-              <a:rPr lang="de-CH" dirty="0">
-                <a:latin typeface="Consolas" panose="020B0609020204030204" pitchFamily="49" charset="0"/>
-              </a:rPr>
-              <a:t> </a:t>
-            </a:r>
-            <a:r>
-              <a:rPr lang="de-CH" dirty="0" err="1">
-                <a:latin typeface="Consolas" panose="020B0609020204030204" pitchFamily="49" charset="0"/>
-              </a:rPr>
-              <a:t>objectArray</a:t>
-            </a:r>
-            <a:r>
-              <a:rPr lang="de-CH" dirty="0">
-                <a:latin typeface="Consolas" panose="020B0609020204030204" pitchFamily="49" charset="0"/>
-              </a:rPr>
-              <a:t> = [{</a:t>
-            </a:r>
-            <a:r>
-              <a:rPr lang="de-CH" dirty="0" err="1">
-                <a:latin typeface="Consolas" panose="020B0609020204030204" pitchFamily="49" charset="0"/>
-              </a:rPr>
-              <a:t>name</a:t>
-            </a:r>
-            <a:r>
-              <a:rPr lang="de-CH" dirty="0">
-                <a:latin typeface="Consolas" panose="020B0609020204030204" pitchFamily="49" charset="0"/>
-              </a:rPr>
-              <a:t>:"</a:t>
-            </a:r>
-            <a:r>
-              <a:rPr lang="de-CH" dirty="0" err="1">
-                <a:latin typeface="Consolas" panose="020B0609020204030204" pitchFamily="49" charset="0"/>
-              </a:rPr>
-              <a:t>name</a:t>
-            </a:r>
-            <a:r>
-              <a:rPr lang="de-CH" dirty="0">
-                <a:latin typeface="Consolas" panose="020B0609020204030204" pitchFamily="49" charset="0"/>
-              </a:rPr>
-              <a:t>",</a:t>
-            </a:r>
-            <a:r>
-              <a:rPr lang="de-CH" dirty="0" err="1">
-                <a:latin typeface="Consolas" panose="020B0609020204030204" pitchFamily="49" charset="0"/>
-              </a:rPr>
-              <a:t>lastname</a:t>
-            </a:r>
-            <a:r>
-              <a:rPr lang="de-CH" dirty="0">
-                <a:latin typeface="Consolas" panose="020B0609020204030204" pitchFamily="49" charset="0"/>
-              </a:rPr>
-              <a:t>:"</a:t>
-            </a:r>
-            <a:r>
-              <a:rPr lang="de-CH" dirty="0" err="1">
-                <a:latin typeface="Consolas" panose="020B0609020204030204" pitchFamily="49" charset="0"/>
-              </a:rPr>
-              <a:t>lastname</a:t>
-            </a:r>
-            <a:r>
-              <a:rPr lang="de-CH" dirty="0">
-                <a:latin typeface="Consolas" panose="020B0609020204030204" pitchFamily="49" charset="0"/>
-              </a:rPr>
-              <a:t>"},{name:"2name",lastname:"2lastname"}]</a:t>
-            </a:r>
-          </a:p>
-          <a:p>
+              <a:t>Codeblock, welcher explizit aufgerufen werden muss</a:t>
+            </a:r>
+          </a:p>
+          <a:p>
+            <a:endParaRPr lang="de-CH" dirty="0">
+              <a:hlinkClick r:id="rId2"/>
+            </a:endParaRPr>
+          </a:p>
+          <a:p>
+            <a:r>
+              <a:rPr lang="de-CH" dirty="0">
+                <a:hlinkClick r:id="rId2"/>
+              </a:rPr>
+              <a:t>https://github.com/martiph/JSTraining_ICT-Campus/blob/master/functions.js</a:t>
+            </a:r>
             <a:endParaRPr lang="de-CH" dirty="0"/>
+          </a:p>
+          <a:p>
+            <a:endParaRPr lang="en-GB" dirty="0"/>
           </a:p>
         </p:txBody>
       </p:sp>
     </p:spTree>
     <p:extLst>
       <p:ext uri="{BB962C8B-B14F-4D97-AF65-F5344CB8AC3E}">
-        <p14:creationId xmlns:p14="http://schemas.microsoft.com/office/powerpoint/2010/main" val="365940414"/>
+        <p14:creationId xmlns:p14="http://schemas.microsoft.com/office/powerpoint/2010/main" val="1574849871"/>
       </p:ext>
     </p:extLst>
   </p:cSld>
@@ -5863,10 +6033,9 @@
           <a:lstStyle/>
           <a:p>
             <a:r>
-              <a:rPr lang="de-CH" dirty="0" err="1"/>
-              <a:t>Functions</a:t>
-            </a:r>
-            <a:endParaRPr lang="de-CH" dirty="0"/>
+              <a:rPr lang="de-CH" dirty="0"/>
+              <a:t>Objects</a:t>
+            </a:r>
           </a:p>
         </p:txBody>
       </p:sp>
@@ -5925,13 +6094,13 @@
               <a:rPr lang="en-GB" dirty="0">
                 <a:hlinkClick r:id="rId2"/>
               </a:rPr>
-              <a:t>/blob/master/</a:t>
+              <a:t>/blob/master/Objects/</a:t>
             </a:r>
             <a:r>
               <a:rPr lang="en-GB" dirty="0" err="1">
                 <a:hlinkClick r:id="rId2"/>
               </a:rPr>
-              <a:t>functions.js</a:t>
+              <a:t>Objects.js</a:t>
             </a:r>
             <a:endParaRPr lang="en-GB" dirty="0"/>
           </a:p>
@@ -5940,7 +6109,7 @@
     </p:spTree>
     <p:extLst>
       <p:ext uri="{BB962C8B-B14F-4D97-AF65-F5344CB8AC3E}">
-        <p14:creationId xmlns:p14="http://schemas.microsoft.com/office/powerpoint/2010/main" val="1574849871"/>
+        <p14:creationId xmlns:p14="http://schemas.microsoft.com/office/powerpoint/2010/main" val="1633889420"/>
       </p:ext>
     </p:extLst>
   </p:cSld>
@@ -5983,8 +6152,12 @@
           <a:lstStyle/>
           <a:p>
             <a:r>
-              <a:rPr lang="de-CH" dirty="0"/>
-              <a:t>Objects</a:t>
+              <a:rPr lang="de-CH" dirty="0" err="1"/>
+              <a:t>Exception</a:t>
+            </a:r>
+            <a:r>
+              <a:rPr lang="de-CH" dirty="0"/>
+              <a:t>-Handling</a:t>
             </a:r>
           </a:p>
         </p:txBody>
@@ -6004,62 +6177,154 @@
           <a:bodyPr/>
           <a:lstStyle/>
           <a:p>
-            <a:r>
-              <a:rPr lang="en-GB" dirty="0">
-                <a:hlinkClick r:id="rId2"/>
-              </a:rPr>
-              <a:t>https://</a:t>
-            </a:r>
-            <a:r>
-              <a:rPr lang="en-GB" dirty="0" err="1">
-                <a:hlinkClick r:id="rId2"/>
-              </a:rPr>
-              <a:t>github.com</a:t>
-            </a:r>
-            <a:r>
-              <a:rPr lang="en-GB" dirty="0">
-                <a:hlinkClick r:id="rId2"/>
-              </a:rPr>
-              <a:t>/</a:t>
-            </a:r>
-            <a:r>
-              <a:rPr lang="en-GB" dirty="0" err="1">
-                <a:hlinkClick r:id="rId2"/>
-              </a:rPr>
-              <a:t>jorisbaiutti</a:t>
-            </a:r>
-            <a:r>
-              <a:rPr lang="en-GB" dirty="0">
-                <a:hlinkClick r:id="rId2"/>
-              </a:rPr>
-              <a:t>/</a:t>
-            </a:r>
-            <a:r>
-              <a:rPr lang="en-GB" dirty="0" err="1">
-                <a:hlinkClick r:id="rId2"/>
-              </a:rPr>
-              <a:t>JSTraining</a:t>
-            </a:r>
-            <a:r>
-              <a:rPr lang="en-GB" dirty="0">
-                <a:hlinkClick r:id="rId2"/>
-              </a:rPr>
-              <a:t>/blob/master/Objects/</a:t>
-            </a:r>
-            <a:r>
-              <a:rPr lang="en-GB" dirty="0" err="1">
-                <a:hlinkClick r:id="rId2"/>
-              </a:rPr>
-              <a:t>Objects.js</a:t>
-            </a:r>
-            <a:endParaRPr lang="en-GB" dirty="0"/>
+            <a:pPr marL="0" indent="0">
+              <a:buNone/>
+            </a:pPr>
+            <a:r>
+              <a:rPr lang="de-CH" dirty="0" err="1">
+                <a:latin typeface="Consolas" panose="020B0609020204030204" pitchFamily="49" charset="0"/>
+              </a:rPr>
+              <a:t>try</a:t>
+            </a:r>
+            <a:r>
+              <a:rPr lang="de-CH" dirty="0">
+                <a:latin typeface="Consolas" panose="020B0609020204030204" pitchFamily="49" charset="0"/>
+              </a:rPr>
+              <a:t>{</a:t>
+            </a:r>
+          </a:p>
+          <a:p>
+            <a:pPr marL="0" indent="0">
+              <a:buNone/>
+            </a:pPr>
+            <a:r>
+              <a:rPr lang="de-CH" dirty="0">
+                <a:latin typeface="Consolas" panose="020B0609020204030204" pitchFamily="49" charset="0"/>
+              </a:rPr>
+              <a:t>	do </a:t>
+            </a:r>
+            <a:r>
+              <a:rPr lang="de-CH" dirty="0" err="1">
+                <a:latin typeface="Consolas" panose="020B0609020204030204" pitchFamily="49" charset="0"/>
+              </a:rPr>
+              <a:t>stuff</a:t>
+            </a:r>
+            <a:r>
+              <a:rPr lang="de-CH" dirty="0">
+                <a:latin typeface="Consolas" panose="020B0609020204030204" pitchFamily="49" charset="0"/>
+              </a:rPr>
+              <a:t>;</a:t>
+            </a:r>
+          </a:p>
+          <a:p>
+            <a:pPr marL="0" indent="0">
+              <a:buNone/>
+            </a:pPr>
+            <a:r>
+              <a:rPr lang="de-CH" dirty="0">
+                <a:latin typeface="Consolas" panose="020B0609020204030204" pitchFamily="49" charset="0"/>
+              </a:rPr>
+              <a:t>}catch(</a:t>
+            </a:r>
+            <a:r>
+              <a:rPr lang="de-CH" dirty="0" err="1">
+                <a:latin typeface="Consolas" panose="020B0609020204030204" pitchFamily="49" charset="0"/>
+              </a:rPr>
+              <a:t>err</a:t>
+            </a:r>
+            <a:r>
+              <a:rPr lang="de-CH" dirty="0">
+                <a:latin typeface="Consolas" panose="020B0609020204030204" pitchFamily="49" charset="0"/>
+              </a:rPr>
+              <a:t>){</a:t>
+            </a:r>
+          </a:p>
+          <a:p>
+            <a:pPr marL="0" indent="0">
+              <a:buNone/>
+            </a:pPr>
+            <a:r>
+              <a:rPr lang="de-CH" dirty="0">
+                <a:latin typeface="Consolas" panose="020B0609020204030204" pitchFamily="49" charset="0"/>
+              </a:rPr>
+              <a:t>	console.log(</a:t>
+            </a:r>
+            <a:r>
+              <a:rPr lang="de-CH" dirty="0" err="1">
+                <a:latin typeface="Consolas" panose="020B0609020204030204" pitchFamily="49" charset="0"/>
+              </a:rPr>
+              <a:t>err</a:t>
+            </a:r>
+            <a:r>
+              <a:rPr lang="de-CH" dirty="0">
+                <a:latin typeface="Consolas" panose="020B0609020204030204" pitchFamily="49" charset="0"/>
+              </a:rPr>
+              <a:t>);</a:t>
+            </a:r>
+          </a:p>
+          <a:p>
+            <a:pPr marL="0" indent="0">
+              <a:buNone/>
+            </a:pPr>
+            <a:r>
+              <a:rPr lang="de-CH" dirty="0">
+                <a:latin typeface="Consolas" panose="020B0609020204030204" pitchFamily="49" charset="0"/>
+              </a:rPr>
+              <a:t>}</a:t>
+            </a:r>
+            <a:r>
+              <a:rPr lang="de-CH" dirty="0" err="1">
+                <a:latin typeface="Consolas" panose="020B0609020204030204" pitchFamily="49" charset="0"/>
+              </a:rPr>
+              <a:t>finally</a:t>
+            </a:r>
+            <a:r>
+              <a:rPr lang="de-CH" dirty="0">
+                <a:latin typeface="Consolas" panose="020B0609020204030204" pitchFamily="49" charset="0"/>
+              </a:rPr>
+              <a:t>{</a:t>
+            </a:r>
+          </a:p>
+          <a:p>
+            <a:pPr marL="0" indent="0">
+              <a:buNone/>
+            </a:pPr>
+            <a:r>
+              <a:rPr lang="de-CH" dirty="0">
+                <a:latin typeface="Consolas" panose="020B0609020204030204" pitchFamily="49" charset="0"/>
+              </a:rPr>
+              <a:t>	do </a:t>
+            </a:r>
+            <a:r>
+              <a:rPr lang="de-CH" dirty="0" err="1">
+                <a:latin typeface="Consolas" panose="020B0609020204030204" pitchFamily="49" charset="0"/>
+              </a:rPr>
+              <a:t>anyway</a:t>
+            </a:r>
+            <a:r>
+              <a:rPr lang="de-CH" dirty="0">
+                <a:latin typeface="Consolas" panose="020B0609020204030204" pitchFamily="49" charset="0"/>
+              </a:rPr>
+              <a:t>;</a:t>
+            </a:r>
+          </a:p>
+          <a:p>
+            <a:pPr marL="0" indent="0">
+              <a:buNone/>
+            </a:pPr>
+            <a:r>
+              <a:rPr lang="de-CH" dirty="0">
+                <a:latin typeface="Consolas" panose="020B0609020204030204" pitchFamily="49" charset="0"/>
+              </a:rPr>
+              <a:t>}</a:t>
+            </a:r>
           </a:p>
         </p:txBody>
       </p:sp>
     </p:spTree>
     <p:extLst>
       <p:ext uri="{BB962C8B-B14F-4D97-AF65-F5344CB8AC3E}">
-        <p14:creationId xmlns:p14="http://schemas.microsoft.com/office/powerpoint/2010/main" val="1633889420"/>
+        <p14:creationId xmlns:p14="http://schemas.microsoft.com/office/powerpoint/2010/main" val="1512234174"/>
       </p:ext>
     </p:extLst>
   </p:cSld>
@@ -6204,12 +6469,8 @@
           <a:lstStyle/>
           <a:p>
             <a:r>
-              <a:rPr lang="de-CH" dirty="0" err="1"/>
-              <a:t>Exception</a:t>
-            </a:r>
-            <a:r>
-              <a:rPr lang="de-CH" dirty="0"/>
-              <a:t>-Handling</a:t>
+              <a:rPr lang="de-CH" dirty="0"/>
+              <a:t>Debugging</a:t>
             </a:r>
           </a:p>
         </p:txBody>
@@ -6229,146 +6490,25 @@
           <a:bodyPr/>
           <a:lstStyle/>
           <a:p>
-            <a:pPr marL="0" indent="0">
-              <a:buNone/>
-            </a:pPr>
+            <a:r>
+              <a:rPr lang="de-CH" dirty="0">
+                <a:latin typeface="Consolas" panose="020B0609020204030204" pitchFamily="49" charset="0"/>
+              </a:rPr>
+              <a:t>Console.log() ;)</a:t>
+            </a:r>
+          </a:p>
+          <a:p>
             <a:r>
               <a:rPr lang="de-CH" dirty="0" err="1">
                 <a:latin typeface="Consolas" panose="020B0609020204030204" pitchFamily="49" charset="0"/>
               </a:rPr>
-              <a:t>try</a:t>
-            </a:r>
-            <a:r>
-              <a:rPr lang="de-CH" dirty="0">
-                <a:latin typeface="Consolas" panose="020B0609020204030204" pitchFamily="49" charset="0"/>
-              </a:rPr>
-              <a:t>{</a:t>
-            </a:r>
-          </a:p>
-          <a:p>
-            <a:pPr marL="0" indent="0">
-              <a:buNone/>
-            </a:pPr>
-            <a:r>
-              <a:rPr lang="de-CH" dirty="0">
-                <a:latin typeface="Consolas" panose="020B0609020204030204" pitchFamily="49" charset="0"/>
-              </a:rPr>
-              <a:t>	do </a:t>
-            </a:r>
-            <a:r>
-              <a:rPr lang="de-CH" dirty="0" err="1">
-                <a:latin typeface="Consolas" panose="020B0609020204030204" pitchFamily="49" charset="0"/>
-              </a:rPr>
-              <a:t>stuff</a:t>
-            </a:r>
-            <a:r>
-              <a:rPr lang="de-CH" dirty="0">
-                <a:latin typeface="Consolas" panose="020B0609020204030204" pitchFamily="49" charset="0"/>
-              </a:rPr>
-              <a:t>;</a:t>
-            </a:r>
-          </a:p>
-          <a:p>
-            <a:pPr marL="0" indent="0">
-              <a:buNone/>
-            </a:pPr>
-            <a:r>
-              <a:rPr lang="de-CH" dirty="0">
-                <a:latin typeface="Consolas" panose="020B0609020204030204" pitchFamily="49" charset="0"/>
-              </a:rPr>
-              <a:t>}catch(</a:t>
-            </a:r>
-            <a:r>
-              <a:rPr lang="de-CH" dirty="0" err="1">
-                <a:latin typeface="Consolas" panose="020B0609020204030204" pitchFamily="49" charset="0"/>
-              </a:rPr>
-              <a:t>err</a:t>
-            </a:r>
-            <a:r>
-              <a:rPr lang="de-CH" dirty="0">
-                <a:latin typeface="Consolas" panose="020B0609020204030204" pitchFamily="49" charset="0"/>
-              </a:rPr>
-              <a:t>){</a:t>
-            </a:r>
-          </a:p>
-          <a:p>
-            <a:pPr marL="0" indent="0">
-              <a:buNone/>
-            </a:pPr>
-            <a:r>
-              <a:rPr lang="de-CH" dirty="0">
-                <a:latin typeface="Consolas" panose="020B0609020204030204" pitchFamily="49" charset="0"/>
-              </a:rPr>
-              <a:t>	console.log(</a:t>
-            </a:r>
-            <a:r>
-              <a:rPr lang="de-CH" dirty="0" err="1">
-                <a:latin typeface="Consolas" panose="020B0609020204030204" pitchFamily="49" charset="0"/>
-              </a:rPr>
-              <a:t>err</a:t>
-            </a:r>
-            <a:r>
-              <a:rPr lang="de-CH" dirty="0">
-                <a:latin typeface="Consolas" panose="020B0609020204030204" pitchFamily="49" charset="0"/>
-              </a:rPr>
-              <a:t>);</a:t>
-            </a:r>
-          </a:p>
-          <a:p>
-            <a:pPr marL="0" indent="0">
-              <a:buNone/>
-            </a:pPr>
-            <a:r>
-              <a:rPr lang="de-CH" dirty="0">
-                <a:latin typeface="Consolas" panose="020B0609020204030204" pitchFamily="49" charset="0"/>
-              </a:rPr>
-              <a:t>}</a:t>
-            </a:r>
-            <a:r>
-              <a:rPr lang="de-CH" dirty="0" err="1">
-                <a:latin typeface="Consolas" panose="020B0609020204030204" pitchFamily="49" charset="0"/>
-              </a:rPr>
-              <a:t>finally</a:t>
-            </a:r>
-            <a:r>
-              <a:rPr lang="de-CH" dirty="0">
-                <a:latin typeface="Consolas" panose="020B0609020204030204" pitchFamily="49" charset="0"/>
-              </a:rPr>
-              <a:t>{</a:t>
-            </a:r>
-          </a:p>
-          <a:p>
-            <a:pPr marL="0" indent="0">
-              <a:buNone/>
-            </a:pPr>
-            <a:r>
-              <a:rPr lang="de-CH" dirty="0">
-                <a:latin typeface="Consolas" panose="020B0609020204030204" pitchFamily="49" charset="0"/>
-              </a:rPr>
-              <a:t>	do </a:t>
-            </a:r>
-            <a:r>
-              <a:rPr lang="de-CH" dirty="0" err="1">
-                <a:latin typeface="Consolas" panose="020B0609020204030204" pitchFamily="49" charset="0"/>
-              </a:rPr>
-              <a:t>anyway</a:t>
-            </a:r>
-            <a:r>
-              <a:rPr lang="de-CH" dirty="0">
-                <a:latin typeface="Consolas" panose="020B0609020204030204" pitchFamily="49" charset="0"/>
-              </a:rPr>
-              <a:t>;</a:t>
-            </a:r>
-          </a:p>
-          <a:p>
-            <a:pPr marL="0" indent="0">
-              <a:buNone/>
-            </a:pPr>
-            <a:r>
-              <a:rPr lang="de-CH" dirty="0">
-                <a:latin typeface="Consolas" panose="020B0609020204030204" pitchFamily="49" charset="0"/>
-              </a:rPr>
-              <a:t>}</a:t>
+              <a:t>debugger</a:t>
+            </a:r>
+            <a:r>
+              <a:rPr lang="de-CH" dirty="0">
+                <a:latin typeface="Consolas" panose="020B0609020204030204" pitchFamily="49" charset="0"/>
+              </a:rPr>
+              <a:t>; //erstellt einen Breakpoint</a:t>
             </a:r>
           </a:p>
         </p:txBody>
@@ -6376,7 +6516,7 @@
     </p:spTree>
     <p:extLst>
       <p:ext uri="{BB962C8B-B14F-4D97-AF65-F5344CB8AC3E}">
-        <p14:creationId xmlns:p14="http://schemas.microsoft.com/office/powerpoint/2010/main" val="1512234174"/>
+        <p14:creationId xmlns:p14="http://schemas.microsoft.com/office/powerpoint/2010/main" val="34123637"/>
       </p:ext>
     </p:extLst>
   </p:cSld>
@@ -6405,7 +6545,13 @@
       </p:grpSpPr>
       <p:sp>
         <p:nvSpPr>
-          <p:cNvPr id="2" name="Title 1"/>
+          <p:cNvPr id="2" name="Titel 1">
+            <a:extLst>
+              <a:ext uri="{FF2B5EF4-FFF2-40B4-BE49-F238E27FC236}">
+                <a16:creationId xmlns:a16="http://schemas.microsoft.com/office/drawing/2014/main" id="{0016EDD1-C5C8-4540-A7E4-E9F9435164D6}"/>
+              </a:ext>
+            </a:extLst>
+          </p:cNvPr>
           <p:cNvSpPr>
             <a:spLocks noGrp="1"/>
           </p:cNvSpPr>
@@ -6419,15 +6565,25 @@
           <a:lstStyle/>
           <a:p>
             <a:r>
-              <a:rPr lang="de-CH" dirty="0"/>
-              <a:t>Debugging</a:t>
-            </a:r>
-          </a:p>
-        </p:txBody>
-      </p:sp>
-      <p:sp>
-        <p:nvSpPr>
-          <p:cNvPr id="3" name="Content Placeholder 2"/>
+              <a:rPr lang="de-CH" dirty="0" err="1"/>
+              <a:t>Strict</a:t>
+            </a:r>
+            <a:r>
+              <a:rPr lang="de-CH" dirty="0"/>
+              <a:t> Mode</a:t>
+            </a:r>
+          </a:p>
+        </p:txBody>
+      </p:sp>
+      <p:sp>
+        <p:nvSpPr>
+          <p:cNvPr id="3" name="Inhaltsplatzhalter 2">
+            <a:extLst>
+              <a:ext uri="{FF2B5EF4-FFF2-40B4-BE49-F238E27FC236}">
+                <a16:creationId xmlns:a16="http://schemas.microsoft.com/office/drawing/2014/main" id="{F9275C41-2819-45CC-A074-C1B6D29A3359}"/>
+              </a:ext>
+            </a:extLst>
+          </p:cNvPr>
           <p:cNvSpPr>
             <a:spLocks noGrp="1"/>
           </p:cNvSpPr>
@@ -6441,36 +6597,89 @@
           <a:lstStyle/>
           <a:p>
             <a:r>
-              <a:rPr lang="de-CH" dirty="0">
-                <a:latin typeface="Consolas" panose="020B0609020204030204" pitchFamily="49" charset="0"/>
-              </a:rPr>
-              <a:t>Console.log() ;)</a:t>
-            </a:r>
-          </a:p>
-          <a:p>
+              <a:rPr lang="de-CH" dirty="0"/>
+              <a:t>Seit ES5</a:t>
+            </a:r>
+          </a:p>
+          <a:p>
+            <a:r>
+              <a:rPr lang="de-CH" dirty="0"/>
+              <a:t>JavaScript ist unsicher</a:t>
+            </a:r>
+          </a:p>
+          <a:p>
+            <a:r>
+              <a:rPr lang="de-CH" dirty="0">
+                <a:latin typeface="Consolas" panose="020B0609020204030204" pitchFamily="49" charset="0"/>
+              </a:rPr>
+              <a:t>‘‘</a:t>
+            </a:r>
             <a:r>
               <a:rPr lang="de-CH" dirty="0" err="1">
                 <a:latin typeface="Consolas" panose="020B0609020204030204" pitchFamily="49" charset="0"/>
               </a:rPr>
-              <a:t>debugger</a:t>
-            </a:r>
-            <a:r>
-              <a:rPr lang="de-CH" dirty="0">
-                <a:latin typeface="Consolas" panose="020B0609020204030204" pitchFamily="49" charset="0"/>
-              </a:rPr>
-              <a:t>; //</a:t>
+              <a:t>use</a:t>
+            </a:r>
+            <a:r>
+              <a:rPr lang="de-CH" dirty="0">
+                <a:latin typeface="Consolas" panose="020B0609020204030204" pitchFamily="49" charset="0"/>
+              </a:rPr>
+              <a:t> </a:t>
             </a:r>
             <a:r>
               <a:rPr lang="de-CH" dirty="0" err="1">
                 <a:latin typeface="Consolas" panose="020B0609020204030204" pitchFamily="49" charset="0"/>
               </a:rPr>
-              <a:t>creates</a:t>
-            </a:r>
-            <a:r>
-              <a:rPr lang="de-CH" dirty="0">
-                <a:latin typeface="Consolas" panose="020B0609020204030204" pitchFamily="49" charset="0"/>
-              </a:rPr>
-              <a:t> a Breakpoint</a:t>
+              <a:t>strict</a:t>
+            </a:r>
+            <a:r>
+              <a:rPr lang="de-CH" dirty="0">
+                <a:latin typeface="Consolas" panose="020B0609020204030204" pitchFamily="49" charset="0"/>
+              </a:rPr>
+              <a:t>’’;</a:t>
+            </a:r>
+          </a:p>
+          <a:p>
+            <a:r>
+              <a:rPr lang="de-CH" dirty="0"/>
+              <a:t>Verhindert:</a:t>
+            </a:r>
+          </a:p>
+          <a:p>
+            <a:pPr lvl="1"/>
+            <a:r>
+              <a:rPr lang="de-CH" sz="2800" dirty="0"/>
+              <a:t>Verwendung von nicht deklarierten Variablen/Objekten</a:t>
+            </a:r>
+          </a:p>
+          <a:p>
+            <a:pPr lvl="1"/>
+            <a:r>
+              <a:rPr lang="de-CH" sz="2800" dirty="0"/>
+              <a:t>Löschen von Funktionen/Variablen/Objekten (mit </a:t>
+            </a:r>
+            <a:r>
+              <a:rPr lang="de-CH" sz="2800" dirty="0" err="1">
+                <a:latin typeface="Consolas" panose="020B0609020204030204" pitchFamily="49" charset="0"/>
+              </a:rPr>
+              <a:t>delete</a:t>
+            </a:r>
+            <a:r>
+              <a:rPr lang="de-CH" sz="2800" dirty="0">
+                <a:latin typeface="Consolas" panose="020B0609020204030204" pitchFamily="49" charset="0"/>
+              </a:rPr>
+              <a:t> x;</a:t>
+            </a:r>
+            <a:r>
+              <a:rPr lang="de-CH" sz="2800" dirty="0"/>
+              <a:t>)</a:t>
+            </a:r>
+          </a:p>
+          <a:p>
+            <a:pPr lvl="1"/>
+            <a:r>
+              <a:rPr lang="de-CH" sz="2800" dirty="0"/>
+              <a:t>Gebrauch von reservierten Wörtern</a:t>
             </a:r>
           </a:p>
         </p:txBody>
@@ -6478,7 +6687,7 @@
     </p:spTree>
     <p:extLst>
       <p:ext uri="{BB962C8B-B14F-4D97-AF65-F5344CB8AC3E}">
-        <p14:creationId xmlns:p14="http://schemas.microsoft.com/office/powerpoint/2010/main" val="34123637"/>
+        <p14:creationId xmlns:p14="http://schemas.microsoft.com/office/powerpoint/2010/main" val="2227674156"/>
       </p:ext>
     </p:extLst>
   </p:cSld>
@@ -6659,6 +6868,140 @@
     <p:extLst>
       <p:ext uri="{BB962C8B-B14F-4D97-AF65-F5344CB8AC3E}">
         <p14:creationId xmlns:p14="http://schemas.microsoft.com/office/powerpoint/2010/main" val="68433193"/>
+      </p:ext>
+    </p:extLst>
+  </p:cSld>
+  <p:clrMapOvr>
+    <a:masterClrMapping/>
+  </p:clrMapOvr>
+</p:sld>
+</file>
+
+<file path=ppt/slides/slide24.xml><?xml version="1.0" encoding="utf-8"?>
+<p:sld xmlns:a="http://schemas.openxmlformats.org/drawingml/2006/main" xmlns:r="http://schemas.openxmlformats.org/officeDocument/2006/relationships" xmlns:p="http://schemas.openxmlformats.org/presentationml/2006/main">
+  <p:cSld>
+    <p:spTree>
+      <p:nvGrpSpPr>
+        <p:cNvPr id="1" name=""/>
+        <p:cNvGrpSpPr/>
+        <p:nvPr/>
+      </p:nvGrpSpPr>
+      <p:grpSpPr>
+        <a:xfrm>
+          <a:off x="0" y="0"/>
+          <a:ext cx="0" cy="0"/>
+          <a:chOff x="0" y="0"/>
+          <a:chExt cx="0" cy="0"/>
+        </a:xfrm>
+      </p:grpSpPr>
+      <p:sp>
+        <p:nvSpPr>
+          <p:cNvPr id="2" name="Titel 1">
+            <a:extLst>
+              <a:ext uri="{FF2B5EF4-FFF2-40B4-BE49-F238E27FC236}">
+                <a16:creationId xmlns:a16="http://schemas.microsoft.com/office/drawing/2014/main" id="{52FF255E-6B70-47EB-B322-AE0EDE058B39}"/>
+              </a:ext>
+            </a:extLst>
+          </p:cNvPr>
+          <p:cNvSpPr>
+            <a:spLocks noGrp="1"/>
+          </p:cNvSpPr>
+          <p:nvPr>
+            <p:ph type="title"/>
+          </p:nvPr>
+        </p:nvSpPr>
+        <p:spPr/>
+        <p:txBody>
+          <a:bodyPr/>
+          <a:lstStyle/>
+          <a:p>
+            <a:r>
+              <a:rPr lang="de-CH" dirty="0"/>
+              <a:t>Nützliche Links</a:t>
+            </a:r>
+          </a:p>
+        </p:txBody>
+      </p:sp>
+      <p:sp>
+        <p:nvSpPr>
+          <p:cNvPr id="3" name="Inhaltsplatzhalter 2">
+            <a:extLst>
+              <a:ext uri="{FF2B5EF4-FFF2-40B4-BE49-F238E27FC236}">
+                <a16:creationId xmlns:a16="http://schemas.microsoft.com/office/drawing/2014/main" id="{ACC111F8-6EB7-4823-BCA6-4458C8F4C2B7}"/>
+              </a:ext>
+            </a:extLst>
+          </p:cNvPr>
+          <p:cNvSpPr>
+            <a:spLocks noGrp="1"/>
+          </p:cNvSpPr>
+          <p:nvPr>
+            <p:ph idx="1"/>
+          </p:nvPr>
+        </p:nvSpPr>
+        <p:spPr/>
+        <p:txBody>
+          <a:bodyPr/>
+          <a:lstStyle/>
+          <a:p>
+            <a:r>
+              <a:rPr lang="de-CH" dirty="0">
+                <a:hlinkClick r:id="rId2"/>
+              </a:rPr>
+              <a:t>https://developer.mozilla.org/de/docs/Web/</a:t>
+            </a:r>
+            <a:r>
+              <a:rPr lang="de-CH" dirty="0"/>
+              <a:t> (Generelle Übersicht)</a:t>
+            </a:r>
+            <a:endParaRPr lang="de-CH" dirty="0">
+              <a:hlinkClick r:id="rId3"/>
+            </a:endParaRPr>
+          </a:p>
+          <a:p>
+            <a:r>
+              <a:rPr lang="de-CH" dirty="0">
+                <a:hlinkClick r:id="rId3"/>
+              </a:rPr>
+              <a:t>https://developer.mozilla.org/de/docs/Web/JavaScript</a:t>
+            </a:r>
+            <a:r>
+              <a:rPr lang="de-CH" dirty="0"/>
+              <a:t> (JS)</a:t>
+            </a:r>
+          </a:p>
+          <a:p>
+            <a:r>
+              <a:rPr lang="de-CH" dirty="0">
+                <a:hlinkClick r:id="rId4"/>
+              </a:rPr>
+              <a:t>https://www.w3schools.com/js/</a:t>
+            </a:r>
+            <a:r>
+              <a:rPr lang="de-CH" dirty="0"/>
+              <a:t> (JS)</a:t>
+            </a:r>
+          </a:p>
+          <a:p>
+            <a:r>
+              <a:rPr lang="de-CH" dirty="0">
+                <a:hlinkClick r:id="rId5"/>
+              </a:rPr>
+              <a:t>https://www.w3schools.com/js/js_htmldom.asp</a:t>
+            </a:r>
+            <a:r>
+              <a:rPr lang="de-CH" dirty="0"/>
+              <a:t> (DOM Manipulation)</a:t>
+            </a:r>
+          </a:p>
+          <a:p>
+            <a:endParaRPr lang="de-CH" dirty="0"/>
+          </a:p>
+        </p:txBody>
+      </p:sp>
+    </p:spTree>
+    <p:extLst>
+      <p:ext uri="{BB962C8B-B14F-4D97-AF65-F5344CB8AC3E}">
+        <p14:creationId xmlns:p14="http://schemas.microsoft.com/office/powerpoint/2010/main" val="1210188577"/>
       </p:ext>
     </p:extLst>
   </p:cSld>
@@ -7085,8 +7428,14 @@
               <a:rPr lang="de-CH" dirty="0">
                 <a:hlinkClick r:id="rId3"/>
               </a:rPr>
-              <a:t>https://github.com/jorisbaiutti/JSTraining/blob/master/executejavascript.html</a:t>
-            </a:r>
+              <a:t>https://github.com/martiph/JSTraining_ICT-Campus/blob/master/HowToReferenceJS/index.html</a:t>
+            </a:r>
+            <a:endParaRPr lang="de-CH" dirty="0"/>
+          </a:p>
+          <a:p>
+            <a:pPr marL="0" indent="0">
+              <a:buNone/>
+            </a:pPr>
             <a:endParaRPr lang="de-CH" dirty="0"/>
           </a:p>
         </p:txBody>
@@ -7261,7 +7610,121 @@
           <a:p>
             <a:r>
               <a:rPr lang="de-CH" dirty="0"/>
-              <a:t>Syntax wie C oder Java</a:t>
+              <a:t>Variablen</a:t>
+            </a:r>
+          </a:p>
+        </p:txBody>
+      </p:sp>
+      <p:sp>
+        <p:nvSpPr>
+          <p:cNvPr id="3" name="Content Placeholder 2"/>
+          <p:cNvSpPr>
+            <a:spLocks noGrp="1"/>
+          </p:cNvSpPr>
+          <p:nvPr>
+            <p:ph idx="1"/>
+          </p:nvPr>
+        </p:nvSpPr>
+        <p:spPr/>
+        <p:txBody>
+          <a:bodyPr/>
+          <a:lstStyle/>
+          <a:p>
+            <a:r>
+              <a:rPr lang="de-CH" dirty="0"/>
+              <a:t>ES5 </a:t>
+            </a:r>
+            <a:r>
+              <a:rPr lang="de-CH" dirty="0" err="1"/>
+              <a:t>var</a:t>
+            </a:r>
+            <a:r>
+              <a:rPr lang="de-CH" dirty="0"/>
+              <a:t> x; </a:t>
+            </a:r>
+            <a:r>
+              <a:rPr lang="de-CH" dirty="0" err="1"/>
+              <a:t>var</a:t>
+            </a:r>
+            <a:r>
+              <a:rPr lang="de-CH" dirty="0"/>
+              <a:t> y = 10; </a:t>
+            </a:r>
+            <a:r>
+              <a:rPr lang="de-CH" dirty="0" err="1"/>
+              <a:t>var</a:t>
+            </a:r>
+            <a:r>
+              <a:rPr lang="de-CH" dirty="0"/>
+              <a:t> z = “Hello”;</a:t>
+            </a:r>
+          </a:p>
+          <a:p>
+            <a:r>
+              <a:rPr lang="de-CH" dirty="0"/>
+              <a:t>ES6 </a:t>
+            </a:r>
+            <a:r>
+              <a:rPr lang="de-CH" dirty="0" err="1"/>
+              <a:t>let</a:t>
+            </a:r>
+            <a:r>
+              <a:rPr lang="de-CH" dirty="0"/>
+              <a:t>, </a:t>
+            </a:r>
+            <a:r>
+              <a:rPr lang="de-CH" dirty="0" err="1"/>
+              <a:t>const</a:t>
+            </a:r>
+            <a:endParaRPr lang="de-CH" dirty="0"/>
+          </a:p>
+          <a:p>
+            <a:r>
+              <a:rPr lang="de-CH" dirty="0" err="1"/>
+              <a:t>let</a:t>
+            </a:r>
+            <a:r>
+              <a:rPr lang="de-CH" dirty="0"/>
+              <a:t>: kein </a:t>
+            </a:r>
+            <a:r>
+              <a:rPr lang="de-CH" dirty="0" err="1"/>
+              <a:t>re-declaring</a:t>
+            </a:r>
+            <a:r>
+              <a:rPr lang="de-CH" dirty="0"/>
+              <a:t>, anderer </a:t>
+            </a:r>
+            <a:r>
+              <a:rPr lang="de-CH" dirty="0" err="1"/>
+              <a:t>Scope</a:t>
+            </a:r>
+            <a:endParaRPr lang="de-CH" dirty="0"/>
+          </a:p>
+          <a:p>
+            <a:r>
+              <a:rPr lang="de-CH" dirty="0" err="1"/>
+              <a:t>const</a:t>
+            </a:r>
+            <a:r>
+              <a:rPr lang="de-CH" dirty="0"/>
+              <a:t>: kein </a:t>
+            </a:r>
+            <a:r>
+              <a:rPr lang="de-CH" dirty="0" err="1"/>
+              <a:t>re-declaring</a:t>
+            </a:r>
+            <a:r>
+              <a:rPr lang="de-CH" dirty="0"/>
+              <a:t>, kein </a:t>
+            </a:r>
+            <a:r>
+              <a:rPr lang="de-CH" dirty="0" err="1"/>
+              <a:t>re-assignment</a:t>
+            </a:r>
+            <a:r>
+              <a:rPr lang="de-CH" dirty="0"/>
+              <a:t> </a:t>
             </a:r>
           </a:p>
         </p:txBody>
@@ -7269,7 +7732,7 @@
     </p:spTree>
     <p:extLst>
       <p:ext uri="{BB962C8B-B14F-4D97-AF65-F5344CB8AC3E}">
-        <p14:creationId xmlns:p14="http://schemas.microsoft.com/office/powerpoint/2010/main" val="820764902"/>
+        <p14:creationId xmlns:p14="http://schemas.microsoft.com/office/powerpoint/2010/main" val="1754301545"/>
       </p:ext>
     </p:extLst>
   </p:cSld>
@@ -7312,8 +7775,28 @@
           <a:lstStyle/>
           <a:p>
             <a:r>
-              <a:rPr lang="de-CH" dirty="0"/>
-              <a:t>Variables</a:t>
+              <a:rPr lang="de-CH" dirty="0" err="1"/>
+              <a:t>If</a:t>
+            </a:r>
+            <a:r>
+              <a:rPr lang="de-CH" dirty="0"/>
+              <a:t>, </a:t>
+            </a:r>
+            <a:r>
+              <a:rPr lang="de-CH" dirty="0" err="1"/>
+              <a:t>else</a:t>
+            </a:r>
+            <a:r>
+              <a:rPr lang="de-CH" dirty="0"/>
+              <a:t> </a:t>
+            </a:r>
+            <a:r>
+              <a:rPr lang="de-CH" dirty="0" err="1"/>
+              <a:t>if</a:t>
+            </a:r>
+            <a:r>
+              <a:rPr lang="de-CH" dirty="0"/>
+              <a:t>, Switch</a:t>
             </a:r>
           </a:p>
         </p:txBody>
@@ -7333,109 +7816,232 @@
           <a:bodyPr/>
           <a:lstStyle/>
           <a:p>
-            <a:r>
-              <a:rPr lang="de-CH" dirty="0"/>
-              <a:t>ES5 </a:t>
-            </a:r>
-            <a:r>
-              <a:rPr lang="de-CH" dirty="0" err="1"/>
-              <a:t>var</a:t>
-            </a:r>
-            <a:r>
-              <a:rPr lang="de-CH" dirty="0"/>
-              <a:t> x; </a:t>
-            </a:r>
-            <a:r>
-              <a:rPr lang="de-CH" dirty="0" err="1"/>
-              <a:t>var</a:t>
-            </a:r>
-            <a:r>
-              <a:rPr lang="de-CH" dirty="0"/>
-              <a:t> y = 10; </a:t>
-            </a:r>
-            <a:r>
-              <a:rPr lang="de-CH" dirty="0" err="1"/>
-              <a:t>var</a:t>
-            </a:r>
-            <a:r>
-              <a:rPr lang="de-CH" dirty="0"/>
-              <a:t> z = “Hello”;</a:t>
-            </a:r>
-          </a:p>
-          <a:p>
-            <a:r>
-              <a:rPr lang="de-CH" dirty="0"/>
-              <a:t>ES6 </a:t>
-            </a:r>
-            <a:r>
-              <a:rPr lang="de-CH" dirty="0" err="1"/>
-              <a:t>let</a:t>
-            </a:r>
-            <a:r>
-              <a:rPr lang="de-CH" dirty="0"/>
-              <a:t>, </a:t>
-            </a:r>
-            <a:r>
-              <a:rPr lang="de-CH" dirty="0" err="1"/>
-              <a:t>const</a:t>
-            </a:r>
+            <a:pPr marL="0" indent="0">
+              <a:buNone/>
+            </a:pPr>
+            <a:r>
+              <a:rPr lang="de-CH" dirty="0" err="1">
+                <a:latin typeface="Consolas" panose="020B0609020204030204" pitchFamily="49" charset="0"/>
+              </a:rPr>
+              <a:t>if</a:t>
+            </a:r>
+            <a:r>
+              <a:rPr lang="de-CH" dirty="0">
+                <a:latin typeface="Consolas" panose="020B0609020204030204" pitchFamily="49" charset="0"/>
+              </a:rPr>
+              <a:t>(</a:t>
+            </a:r>
+            <a:r>
+              <a:rPr lang="de-CH" dirty="0" err="1">
+                <a:latin typeface="Consolas" panose="020B0609020204030204" pitchFamily="49" charset="0"/>
+              </a:rPr>
+              <a:t>true</a:t>
+            </a:r>
+            <a:r>
+              <a:rPr lang="de-CH" dirty="0">
+                <a:latin typeface="Consolas" panose="020B0609020204030204" pitchFamily="49" charset="0"/>
+              </a:rPr>
+              <a:t>){</a:t>
+            </a:r>
+          </a:p>
+          <a:p>
+            <a:pPr marL="0" indent="0">
+              <a:buNone/>
+            </a:pPr>
+            <a:r>
+              <a:rPr lang="de-CH" dirty="0">
+                <a:latin typeface="Consolas" panose="020B0609020204030204" pitchFamily="49" charset="0"/>
+              </a:rPr>
+              <a:t>	do </a:t>
+            </a:r>
+            <a:r>
+              <a:rPr lang="de-CH" dirty="0" err="1">
+                <a:latin typeface="Consolas" panose="020B0609020204030204" pitchFamily="49" charset="0"/>
+              </a:rPr>
+              <a:t>stuff</a:t>
+            </a:r>
+            <a:endParaRPr lang="de-CH" dirty="0">
+              <a:latin typeface="Consolas" panose="020B0609020204030204" pitchFamily="49" charset="0"/>
+            </a:endParaRPr>
+          </a:p>
+          <a:p>
+            <a:pPr marL="0" indent="0">
+              <a:buNone/>
+            </a:pPr>
+            <a:r>
+              <a:rPr lang="de-CH" dirty="0">
+                <a:latin typeface="Consolas" panose="020B0609020204030204" pitchFamily="49" charset="0"/>
+              </a:rPr>
+              <a:t>}</a:t>
+            </a:r>
+            <a:r>
+              <a:rPr lang="de-CH" dirty="0" err="1">
+                <a:latin typeface="Consolas" panose="020B0609020204030204" pitchFamily="49" charset="0"/>
+              </a:rPr>
+              <a:t>else</a:t>
+            </a:r>
+            <a:r>
+              <a:rPr lang="de-CH" dirty="0">
+                <a:latin typeface="Consolas" panose="020B0609020204030204" pitchFamily="49" charset="0"/>
+              </a:rPr>
+              <a:t> </a:t>
+            </a:r>
+            <a:r>
+              <a:rPr lang="de-CH" dirty="0" err="1">
+                <a:latin typeface="Consolas" panose="020B0609020204030204" pitchFamily="49" charset="0"/>
+              </a:rPr>
+              <a:t>if</a:t>
+            </a:r>
+            <a:r>
+              <a:rPr lang="de-CH" dirty="0">
+                <a:latin typeface="Consolas" panose="020B0609020204030204" pitchFamily="49" charset="0"/>
+              </a:rPr>
+              <a:t>(</a:t>
+            </a:r>
+            <a:r>
+              <a:rPr lang="de-CH" dirty="0" err="1">
+                <a:latin typeface="Consolas" panose="020B0609020204030204" pitchFamily="49" charset="0"/>
+              </a:rPr>
+              <a:t>true</a:t>
+            </a:r>
+            <a:r>
+              <a:rPr lang="de-CH" dirty="0">
+                <a:latin typeface="Consolas" panose="020B0609020204030204" pitchFamily="49" charset="0"/>
+              </a:rPr>
+              <a:t>){</a:t>
+            </a:r>
+          </a:p>
+          <a:p>
+            <a:pPr marL="0" indent="0">
+              <a:buNone/>
+            </a:pPr>
+            <a:r>
+              <a:rPr lang="de-CH" dirty="0">
+                <a:latin typeface="Consolas" panose="020B0609020204030204" pitchFamily="49" charset="0"/>
+              </a:rPr>
+              <a:t>	do </a:t>
+            </a:r>
+            <a:r>
+              <a:rPr lang="de-CH" dirty="0" err="1">
+                <a:latin typeface="Consolas" panose="020B0609020204030204" pitchFamily="49" charset="0"/>
+              </a:rPr>
+              <a:t>other</a:t>
+            </a:r>
+            <a:r>
+              <a:rPr lang="de-CH" dirty="0">
+                <a:latin typeface="Consolas" panose="020B0609020204030204" pitchFamily="49" charset="0"/>
+              </a:rPr>
+              <a:t> </a:t>
+            </a:r>
+            <a:r>
+              <a:rPr lang="de-CH" dirty="0" err="1">
+                <a:latin typeface="Consolas" panose="020B0609020204030204" pitchFamily="49" charset="0"/>
+              </a:rPr>
+              <a:t>stuff</a:t>
+            </a:r>
+            <a:endParaRPr lang="de-CH" dirty="0">
+              <a:latin typeface="Consolas" panose="020B0609020204030204" pitchFamily="49" charset="0"/>
+            </a:endParaRPr>
+          </a:p>
+          <a:p>
+            <a:pPr marL="0" indent="0">
+              <a:buNone/>
+            </a:pPr>
+            <a:r>
+              <a:rPr lang="de-CH" dirty="0">
+                <a:latin typeface="Consolas" panose="020B0609020204030204" pitchFamily="49" charset="0"/>
+              </a:rPr>
+              <a:t>}</a:t>
+            </a:r>
+            <a:r>
+              <a:rPr lang="de-CH" dirty="0" err="1">
+                <a:latin typeface="Consolas" panose="020B0609020204030204" pitchFamily="49" charset="0"/>
+              </a:rPr>
+              <a:t>else</a:t>
+            </a:r>
+            <a:r>
+              <a:rPr lang="de-CH" dirty="0">
+                <a:latin typeface="Consolas" panose="020B0609020204030204" pitchFamily="49" charset="0"/>
+              </a:rPr>
+              <a:t> {</a:t>
+            </a:r>
+          </a:p>
+          <a:p>
+            <a:pPr marL="0" indent="0">
+              <a:buNone/>
+            </a:pPr>
+            <a:r>
+              <a:rPr lang="de-CH" dirty="0">
+                <a:latin typeface="Consolas" panose="020B0609020204030204" pitchFamily="49" charset="0"/>
+              </a:rPr>
+              <a:t>	do </a:t>
+            </a:r>
+            <a:r>
+              <a:rPr lang="de-CH" dirty="0" err="1">
+                <a:latin typeface="Consolas" panose="020B0609020204030204" pitchFamily="49" charset="0"/>
+              </a:rPr>
+              <a:t>everything</a:t>
+            </a:r>
+            <a:r>
+              <a:rPr lang="de-CH" dirty="0">
+                <a:latin typeface="Consolas" panose="020B0609020204030204" pitchFamily="49" charset="0"/>
+              </a:rPr>
+              <a:t> </a:t>
+            </a:r>
+            <a:r>
+              <a:rPr lang="de-CH" dirty="0" err="1">
+                <a:latin typeface="Consolas" panose="020B0609020204030204" pitchFamily="49" charset="0"/>
+              </a:rPr>
+              <a:t>else</a:t>
+            </a:r>
+            <a:endParaRPr lang="de-CH" dirty="0">
+              <a:latin typeface="Consolas" panose="020B0609020204030204" pitchFamily="49" charset="0"/>
+            </a:endParaRPr>
+          </a:p>
+          <a:p>
+            <a:pPr marL="0" indent="0">
+              <a:buNone/>
+            </a:pPr>
+            <a:r>
+              <a:rPr lang="de-CH" dirty="0">
+                <a:latin typeface="Consolas" panose="020B0609020204030204" pitchFamily="49" charset="0"/>
+              </a:rPr>
+              <a:t>}</a:t>
+            </a:r>
+          </a:p>
+          <a:p>
             <a:endParaRPr lang="de-CH" dirty="0"/>
           </a:p>
-          <a:p>
-            <a:r>
-              <a:rPr lang="de-CH" dirty="0" err="1"/>
-              <a:t>let</a:t>
-            </a:r>
-            <a:r>
-              <a:rPr lang="de-CH" dirty="0"/>
-              <a:t>: kein </a:t>
-            </a:r>
-            <a:r>
-              <a:rPr lang="de-CH" dirty="0" err="1"/>
-              <a:t>re-declaring</a:t>
-            </a:r>
-            <a:r>
-              <a:rPr lang="de-CH" dirty="0"/>
-              <a:t>, anderer </a:t>
-            </a:r>
-            <a:r>
-              <a:rPr lang="de-CH" dirty="0" err="1"/>
-              <a:t>Scope</a:t>
-            </a:r>
-            <a:endParaRPr lang="de-CH" dirty="0"/>
-          </a:p>
-          <a:p>
-            <a:r>
-              <a:rPr lang="de-CH" dirty="0" err="1"/>
-              <a:t>const</a:t>
-            </a:r>
-            <a:r>
-              <a:rPr lang="de-CH" dirty="0"/>
-              <a:t>: kein </a:t>
-            </a:r>
-            <a:r>
-              <a:rPr lang="de-CH" dirty="0" err="1"/>
-              <a:t>re-declaring</a:t>
-            </a:r>
-            <a:r>
-              <a:rPr lang="de-CH" dirty="0"/>
-              <a:t>, kein </a:t>
-            </a:r>
-            <a:r>
-              <a:rPr lang="de-CH" dirty="0" err="1"/>
-              <a:t>re-assignment</a:t>
-            </a:r>
-            <a:r>
-              <a:rPr lang="de-CH" dirty="0"/>
-              <a:t> </a:t>
-            </a:r>
-          </a:p>
-        </p:txBody>
-      </p:sp>
+        </p:txBody>
+      </p:sp>
+      <p:pic>
+        <p:nvPicPr>
+          <p:cNvPr id="4" name="Picture 3"/>
+          <p:cNvPicPr>
+            <a:picLocks noChangeAspect="1"/>
+          </p:cNvPicPr>
+          <p:nvPr/>
+        </p:nvPicPr>
+        <p:blipFill>
+          <a:blip r:embed="rId2"/>
+          <a:stretch>
+            <a:fillRect/>
+          </a:stretch>
+        </p:blipFill>
+        <p:spPr>
+          <a:xfrm>
+            <a:off x="7181850" y="1825625"/>
+            <a:ext cx="3505200" cy="3443052"/>
+          </a:xfrm>
+          <a:prstGeom prst="rect">
+            <a:avLst/>
+          </a:prstGeom>
+        </p:spPr>
+      </p:pic>
     </p:spTree>
     <p:extLst>
       <p:ext uri="{BB962C8B-B14F-4D97-AF65-F5344CB8AC3E}">
-        <p14:creationId xmlns:p14="http://schemas.microsoft.com/office/powerpoint/2010/main" val="1754301545"/>
+        <p14:creationId xmlns:p14="http://schemas.microsoft.com/office/powerpoint/2010/main" val="1450258862"/>
       </p:ext>
     </p:extLst>
   </p:cSld>

</xml_diff>